<commit_message>
Update the name of the comparison tests. Also, update the diagram of new MOMF work flow
</commit_message>
<xml_diff>
--- a/tests/Workflow tests.pptx
+++ b/tests/Workflow tests.pptx
@@ -6,6 +6,7 @@
   </p:sldMasterIdLst>
   <p:sldIdLst>
     <p:sldId id="256" r:id="rId2"/>
+    <p:sldId id="257" r:id="rId3"/>
   </p:sldIdLst>
   <p:sldSz cx="12192000" cy="6858000"/>
   <p:notesSz cx="6858000" cy="9144000"/>
@@ -104,6 +105,11 @@
       </a:defRPr>
     </a:lvl9pPr>
   </p:defaultTextStyle>
+  <p:extLst>
+    <p:ext uri="{EFAFB233-063F-42B5-8137-9DF3F51BA10A}">
+      <p15:sldGuideLst xmlns:p15="http://schemas.microsoft.com/office/powerpoint/2012/main"/>
+    </p:ext>
+  </p:extLst>
 </p:presentation>
 </file>
 
@@ -254,7 +260,7 @@
           <a:p>
             <a:fld id="{658EA266-B578-4102-83B4-FCF105840A2B}" type="datetimeFigureOut">
               <a:rPr lang="en-US" smtClean="0"/>
-              <a:t>4/8/2024</a:t>
+              <a:t>6/25/2024</a:t>
             </a:fld>
             <a:endParaRPr lang="en-US"/>
           </a:p>
@@ -452,7 +458,7 @@
           <a:p>
             <a:fld id="{658EA266-B578-4102-83B4-FCF105840A2B}" type="datetimeFigureOut">
               <a:rPr lang="en-US" smtClean="0"/>
-              <a:t>4/8/2024</a:t>
+              <a:t>6/25/2024</a:t>
             </a:fld>
             <a:endParaRPr lang="en-US"/>
           </a:p>
@@ -660,7 +666,7 @@
           <a:p>
             <a:fld id="{658EA266-B578-4102-83B4-FCF105840A2B}" type="datetimeFigureOut">
               <a:rPr lang="en-US" smtClean="0"/>
-              <a:t>4/8/2024</a:t>
+              <a:t>6/25/2024</a:t>
             </a:fld>
             <a:endParaRPr lang="en-US"/>
           </a:p>
@@ -858,7 +864,7 @@
           <a:p>
             <a:fld id="{658EA266-B578-4102-83B4-FCF105840A2B}" type="datetimeFigureOut">
               <a:rPr lang="en-US" smtClean="0"/>
-              <a:t>4/8/2024</a:t>
+              <a:t>6/25/2024</a:t>
             </a:fld>
             <a:endParaRPr lang="en-US"/>
           </a:p>
@@ -1133,7 +1139,7 @@
           <a:p>
             <a:fld id="{658EA266-B578-4102-83B4-FCF105840A2B}" type="datetimeFigureOut">
               <a:rPr lang="en-US" smtClean="0"/>
-              <a:t>4/8/2024</a:t>
+              <a:t>6/25/2024</a:t>
             </a:fld>
             <a:endParaRPr lang="en-US"/>
           </a:p>
@@ -1398,7 +1404,7 @@
           <a:p>
             <a:fld id="{658EA266-B578-4102-83B4-FCF105840A2B}" type="datetimeFigureOut">
               <a:rPr lang="en-US" smtClean="0"/>
-              <a:t>4/8/2024</a:t>
+              <a:t>6/25/2024</a:t>
             </a:fld>
             <a:endParaRPr lang="en-US"/>
           </a:p>
@@ -1810,7 +1816,7 @@
           <a:p>
             <a:fld id="{658EA266-B578-4102-83B4-FCF105840A2B}" type="datetimeFigureOut">
               <a:rPr lang="en-US" smtClean="0"/>
-              <a:t>4/8/2024</a:t>
+              <a:t>6/25/2024</a:t>
             </a:fld>
             <a:endParaRPr lang="en-US"/>
           </a:p>
@@ -1951,7 +1957,7 @@
           <a:p>
             <a:fld id="{658EA266-B578-4102-83B4-FCF105840A2B}" type="datetimeFigureOut">
               <a:rPr lang="en-US" smtClean="0"/>
-              <a:t>4/8/2024</a:t>
+              <a:t>6/25/2024</a:t>
             </a:fld>
             <a:endParaRPr lang="en-US"/>
           </a:p>
@@ -2064,7 +2070,7 @@
           <a:p>
             <a:fld id="{658EA266-B578-4102-83B4-FCF105840A2B}" type="datetimeFigureOut">
               <a:rPr lang="en-US" smtClean="0"/>
-              <a:t>4/8/2024</a:t>
+              <a:t>6/25/2024</a:t>
             </a:fld>
             <a:endParaRPr lang="en-US"/>
           </a:p>
@@ -2375,7 +2381,7 @@
           <a:p>
             <a:fld id="{658EA266-B578-4102-83B4-FCF105840A2B}" type="datetimeFigureOut">
               <a:rPr lang="en-US" smtClean="0"/>
-              <a:t>4/8/2024</a:t>
+              <a:t>6/25/2024</a:t>
             </a:fld>
             <a:endParaRPr lang="en-US"/>
           </a:p>
@@ -2663,7 +2669,7 @@
           <a:p>
             <a:fld id="{658EA266-B578-4102-83B4-FCF105840A2B}" type="datetimeFigureOut">
               <a:rPr lang="en-US" smtClean="0"/>
-              <a:t>4/8/2024</a:t>
+              <a:t>6/25/2024</a:t>
             </a:fld>
             <a:endParaRPr lang="en-US"/>
           </a:p>
@@ -2904,7 +2910,7 @@
           <a:p>
             <a:fld id="{658EA266-B578-4102-83B4-FCF105840A2B}" type="datetimeFigureOut">
               <a:rPr lang="en-US" smtClean="0"/>
-              <a:t>4/8/2024</a:t>
+              <a:t>6/25/2024</a:t>
             </a:fld>
             <a:endParaRPr lang="en-US"/>
           </a:p>
@@ -4210,6 +4216,2954 @@
     <p:extLst>
       <p:ext uri="{BB962C8B-B14F-4D97-AF65-F5344CB8AC3E}">
         <p14:creationId xmlns:p14="http://schemas.microsoft.com/office/powerpoint/2010/main" val="1607477960"/>
+      </p:ext>
+    </p:extLst>
+  </p:cSld>
+  <p:clrMapOvr>
+    <a:masterClrMapping/>
+  </p:clrMapOvr>
+</p:sld>
+</file>
+
+<file path=ppt/slides/slide2.xml><?xml version="1.0" encoding="utf-8"?>
+<p:sld xmlns:a="http://schemas.openxmlformats.org/drawingml/2006/main" xmlns:r="http://schemas.openxmlformats.org/officeDocument/2006/relationships" xmlns:p="http://schemas.openxmlformats.org/presentationml/2006/main">
+  <p:cSld>
+    <p:spTree>
+      <p:nvGrpSpPr>
+        <p:cNvPr id="1" name=""/>
+        <p:cNvGrpSpPr/>
+        <p:nvPr/>
+      </p:nvGrpSpPr>
+      <p:grpSpPr>
+        <a:xfrm>
+          <a:off x="0" y="0"/>
+          <a:ext cx="0" cy="0"/>
+          <a:chOff x="0" y="0"/>
+          <a:chExt cx="0" cy="0"/>
+        </a:xfrm>
+      </p:grpSpPr>
+      <p:sp>
+        <p:nvSpPr>
+          <p:cNvPr id="2" name="Rectangle 1">
+            <a:extLst>
+              <a:ext uri="{FF2B5EF4-FFF2-40B4-BE49-F238E27FC236}">
+                <a16:creationId xmlns:a16="http://schemas.microsoft.com/office/drawing/2014/main" id="{A8D109B4-E29E-6D64-0D65-FBD46519AD97}"/>
+              </a:ext>
+            </a:extLst>
+          </p:cNvPr>
+          <p:cNvSpPr/>
+          <p:nvPr/>
+        </p:nvSpPr>
+        <p:spPr>
+          <a:xfrm>
+            <a:off x="91440" y="1307927"/>
+            <a:ext cx="2404872" cy="505709"/>
+          </a:xfrm>
+          <a:prstGeom prst="rect">
+            <a:avLst/>
+          </a:prstGeom>
+        </p:spPr>
+        <p:style>
+          <a:lnRef idx="2">
+            <a:schemeClr val="accent4">
+              <a:shade val="15000"/>
+            </a:schemeClr>
+          </a:lnRef>
+          <a:fillRef idx="1">
+            <a:schemeClr val="accent4"/>
+          </a:fillRef>
+          <a:effectRef idx="0">
+            <a:schemeClr val="accent4"/>
+          </a:effectRef>
+          <a:fontRef idx="minor">
+            <a:schemeClr val="lt1"/>
+          </a:fontRef>
+        </p:style>
+        <p:txBody>
+          <a:bodyPr rtlCol="0" anchor="ctr"/>
+          <a:lstStyle/>
+          <a:p>
+            <a:pPr algn="ctr"/>
+            <a:r>
+              <a:rPr lang="es-CR" dirty="0" err="1"/>
+              <a:t>Function</a:t>
+            </a:r>
+            <a:r>
+              <a:rPr lang="en-GB" dirty="0"/>
+              <a:t>_</a:t>
+            </a:r>
+            <a:r>
+              <a:rPr lang="en-GB" dirty="0" err="1"/>
+              <a:t>C_Mathprog</a:t>
+            </a:r>
+            <a:endParaRPr lang="en-US" dirty="0"/>
+          </a:p>
+        </p:txBody>
+      </p:sp>
+      <p:sp>
+        <p:nvSpPr>
+          <p:cNvPr id="3" name="Oval 2">
+            <a:extLst>
+              <a:ext uri="{FF2B5EF4-FFF2-40B4-BE49-F238E27FC236}">
+                <a16:creationId xmlns:a16="http://schemas.microsoft.com/office/drawing/2014/main" id="{21C3D29D-607A-9445-7A9F-9C112D227CC6}"/>
+              </a:ext>
+            </a:extLst>
+          </p:cNvPr>
+          <p:cNvSpPr/>
+          <p:nvPr/>
+        </p:nvSpPr>
+        <p:spPr>
+          <a:xfrm>
+            <a:off x="667512" y="228600"/>
+            <a:ext cx="1252728" cy="731520"/>
+          </a:xfrm>
+          <a:prstGeom prst="ellipse">
+            <a:avLst/>
+          </a:prstGeom>
+        </p:spPr>
+        <p:style>
+          <a:lnRef idx="2">
+            <a:schemeClr val="accent4">
+              <a:shade val="15000"/>
+            </a:schemeClr>
+          </a:lnRef>
+          <a:fillRef idx="1">
+            <a:schemeClr val="accent4"/>
+          </a:fillRef>
+          <a:effectRef idx="0">
+            <a:schemeClr val="accent4"/>
+          </a:effectRef>
+          <a:fontRef idx="minor">
+            <a:schemeClr val="lt1"/>
+          </a:fontRef>
+        </p:style>
+        <p:txBody>
+          <a:bodyPr rtlCol="0" anchor="ctr"/>
+          <a:lstStyle/>
+          <a:p>
+            <a:pPr algn="ctr"/>
+            <a:r>
+              <a:rPr lang="es-CR" dirty="0"/>
+              <a:t>MOMF</a:t>
+            </a:r>
+            <a:endParaRPr lang="en-US" dirty="0"/>
+          </a:p>
+        </p:txBody>
+      </p:sp>
+      <p:sp>
+        <p:nvSpPr>
+          <p:cNvPr id="4" name="Rectangle 3">
+            <a:extLst>
+              <a:ext uri="{FF2B5EF4-FFF2-40B4-BE49-F238E27FC236}">
+                <a16:creationId xmlns:a16="http://schemas.microsoft.com/office/drawing/2014/main" id="{A1C0350B-E104-A53E-885F-A2E54AA1DD07}"/>
+              </a:ext>
+            </a:extLst>
+          </p:cNvPr>
+          <p:cNvSpPr/>
+          <p:nvPr/>
+        </p:nvSpPr>
+        <p:spPr>
+          <a:xfrm>
+            <a:off x="461282" y="2300609"/>
+            <a:ext cx="1673352" cy="517423"/>
+          </a:xfrm>
+          <a:prstGeom prst="rect">
+            <a:avLst/>
+          </a:prstGeom>
+        </p:spPr>
+        <p:style>
+          <a:lnRef idx="2">
+            <a:schemeClr val="accent4">
+              <a:shade val="15000"/>
+            </a:schemeClr>
+          </a:lnRef>
+          <a:fillRef idx="1">
+            <a:schemeClr val="accent4"/>
+          </a:fillRef>
+          <a:effectRef idx="0">
+            <a:schemeClr val="accent4"/>
+          </a:effectRef>
+          <a:fontRef idx="minor">
+            <a:schemeClr val="lt1"/>
+          </a:fontRef>
+        </p:style>
+        <p:txBody>
+          <a:bodyPr rtlCol="0" anchor="ctr"/>
+          <a:lstStyle/>
+          <a:p>
+            <a:pPr algn="ctr"/>
+            <a:r>
+              <a:rPr lang="en-GB" dirty="0" err="1"/>
+              <a:t>main_executer</a:t>
+            </a:r>
+            <a:endParaRPr lang="en-US" dirty="0"/>
+          </a:p>
+        </p:txBody>
+      </p:sp>
+      <p:cxnSp>
+        <p:nvCxnSpPr>
+          <p:cNvPr id="8" name="Straight Arrow Connector 7">
+            <a:extLst>
+              <a:ext uri="{FF2B5EF4-FFF2-40B4-BE49-F238E27FC236}">
+                <a16:creationId xmlns:a16="http://schemas.microsoft.com/office/drawing/2014/main" id="{86E0EE90-03EA-50B9-EDAE-6B25CE28BF7F}"/>
+              </a:ext>
+            </a:extLst>
+          </p:cNvPr>
+          <p:cNvCxnSpPr>
+            <a:cxnSpLocks/>
+            <a:stCxn id="3" idx="4"/>
+            <a:endCxn id="2" idx="0"/>
+          </p:cNvCxnSpPr>
+          <p:nvPr/>
+        </p:nvCxnSpPr>
+        <p:spPr>
+          <a:xfrm>
+            <a:off x="1293876" y="960120"/>
+            <a:ext cx="0" cy="347807"/>
+          </a:xfrm>
+          <a:prstGeom prst="straightConnector1">
+            <a:avLst/>
+          </a:prstGeom>
+          <a:ln>
+            <a:tailEnd type="triangle"/>
+          </a:ln>
+        </p:spPr>
+        <p:style>
+          <a:lnRef idx="2">
+            <a:schemeClr val="dk1"/>
+          </a:lnRef>
+          <a:fillRef idx="0">
+            <a:schemeClr val="dk1"/>
+          </a:fillRef>
+          <a:effectRef idx="1">
+            <a:schemeClr val="dk1"/>
+          </a:effectRef>
+          <a:fontRef idx="minor">
+            <a:schemeClr val="tx1"/>
+          </a:fontRef>
+        </p:style>
+      </p:cxnSp>
+      <p:cxnSp>
+        <p:nvCxnSpPr>
+          <p:cNvPr id="10" name="Straight Arrow Connector 9">
+            <a:extLst>
+              <a:ext uri="{FF2B5EF4-FFF2-40B4-BE49-F238E27FC236}">
+                <a16:creationId xmlns:a16="http://schemas.microsoft.com/office/drawing/2014/main" id="{D79DAD6D-9F8D-0EEE-54AA-236B468835B1}"/>
+              </a:ext>
+            </a:extLst>
+          </p:cNvPr>
+          <p:cNvCxnSpPr>
+            <a:cxnSpLocks/>
+            <a:stCxn id="2" idx="2"/>
+            <a:endCxn id="4" idx="0"/>
+          </p:cNvCxnSpPr>
+          <p:nvPr/>
+        </p:nvCxnSpPr>
+        <p:spPr>
+          <a:xfrm>
+            <a:off x="1293876" y="1813636"/>
+            <a:ext cx="4082" cy="486973"/>
+          </a:xfrm>
+          <a:prstGeom prst="straightConnector1">
+            <a:avLst/>
+          </a:prstGeom>
+          <a:ln>
+            <a:tailEnd type="triangle"/>
+          </a:ln>
+        </p:spPr>
+        <p:style>
+          <a:lnRef idx="2">
+            <a:schemeClr val="dk1"/>
+          </a:lnRef>
+          <a:fillRef idx="0">
+            <a:schemeClr val="dk1"/>
+          </a:fillRef>
+          <a:effectRef idx="1">
+            <a:schemeClr val="dk1"/>
+          </a:effectRef>
+          <a:fontRef idx="minor">
+            <a:schemeClr val="tx1"/>
+          </a:fontRef>
+        </p:style>
+      </p:cxnSp>
+      <p:sp>
+        <p:nvSpPr>
+          <p:cNvPr id="15" name="TextBox 14">
+            <a:extLst>
+              <a:ext uri="{FF2B5EF4-FFF2-40B4-BE49-F238E27FC236}">
+                <a16:creationId xmlns:a16="http://schemas.microsoft.com/office/drawing/2014/main" id="{1FEDD6CB-02E3-3294-62D8-B3AABE467DD9}"/>
+              </a:ext>
+            </a:extLst>
+          </p:cNvPr>
+          <p:cNvSpPr txBox="1"/>
+          <p:nvPr/>
+        </p:nvSpPr>
+        <p:spPr>
+          <a:xfrm>
+            <a:off x="2617295" y="957705"/>
+            <a:ext cx="788999" cy="369332"/>
+          </a:xfrm>
+          <a:prstGeom prst="rect">
+            <a:avLst/>
+          </a:prstGeom>
+          <a:noFill/>
+        </p:spPr>
+        <p:txBody>
+          <a:bodyPr wrap="none" rtlCol="0">
+            <a:spAutoFit/>
+          </a:bodyPr>
+          <a:lstStyle/>
+          <a:p>
+            <a:r>
+              <a:rPr lang="en-GB" dirty="0"/>
+              <a:t>txt file</a:t>
+            </a:r>
+            <a:endParaRPr lang="en-US" dirty="0"/>
+          </a:p>
+        </p:txBody>
+      </p:sp>
+      <p:sp>
+        <p:nvSpPr>
+          <p:cNvPr id="16" name="Rectangle 15">
+            <a:extLst>
+              <a:ext uri="{FF2B5EF4-FFF2-40B4-BE49-F238E27FC236}">
+                <a16:creationId xmlns:a16="http://schemas.microsoft.com/office/drawing/2014/main" id="{8DBC7921-12AB-0C7B-6DD2-66378EE8EA82}"/>
+              </a:ext>
+            </a:extLst>
+          </p:cNvPr>
+          <p:cNvSpPr/>
+          <p:nvPr/>
+        </p:nvSpPr>
+        <p:spPr>
+          <a:xfrm>
+            <a:off x="6513145" y="267654"/>
+            <a:ext cx="1728215" cy="603504"/>
+          </a:xfrm>
+          <a:prstGeom prst="rect">
+            <a:avLst/>
+          </a:prstGeom>
+        </p:spPr>
+        <p:style>
+          <a:lnRef idx="2">
+            <a:schemeClr val="accent4">
+              <a:shade val="15000"/>
+            </a:schemeClr>
+          </a:lnRef>
+          <a:fillRef idx="1">
+            <a:schemeClr val="accent4"/>
+          </a:fillRef>
+          <a:effectRef idx="0">
+            <a:schemeClr val="accent4"/>
+          </a:effectRef>
+          <a:fontRef idx="minor">
+            <a:schemeClr val="lt1"/>
+          </a:fontRef>
+        </p:style>
+        <p:txBody>
+          <a:bodyPr rtlCol="0" anchor="ctr"/>
+          <a:lstStyle/>
+          <a:p>
+            <a:pPr algn="ctr"/>
+            <a:r>
+              <a:rPr lang="en-GB" dirty="0" err="1"/>
+              <a:t>data_processor</a:t>
+            </a:r>
+            <a:endParaRPr lang="en-US" dirty="0"/>
+          </a:p>
+        </p:txBody>
+      </p:sp>
+      <p:cxnSp>
+        <p:nvCxnSpPr>
+          <p:cNvPr id="18" name="Connector: Elbow 17">
+            <a:extLst>
+              <a:ext uri="{FF2B5EF4-FFF2-40B4-BE49-F238E27FC236}">
+                <a16:creationId xmlns:a16="http://schemas.microsoft.com/office/drawing/2014/main" id="{283C3046-FEDB-238A-9888-7B748CEE2D4A}"/>
+              </a:ext>
+            </a:extLst>
+          </p:cNvPr>
+          <p:cNvCxnSpPr>
+            <a:cxnSpLocks/>
+            <a:stCxn id="75" idx="3"/>
+            <a:endCxn id="16" idx="1"/>
+          </p:cNvCxnSpPr>
+          <p:nvPr/>
+        </p:nvCxnSpPr>
+        <p:spPr>
+          <a:xfrm flipV="1">
+            <a:off x="5144689" y="569406"/>
+            <a:ext cx="1368456" cy="756474"/>
+          </a:xfrm>
+          <a:prstGeom prst="bentConnector3">
+            <a:avLst>
+              <a:gd name="adj1" fmla="val 50000"/>
+            </a:avLst>
+          </a:prstGeom>
+          <a:ln>
+            <a:tailEnd type="triangle"/>
+          </a:ln>
+        </p:spPr>
+        <p:style>
+          <a:lnRef idx="2">
+            <a:schemeClr val="dk1"/>
+          </a:lnRef>
+          <a:fillRef idx="0">
+            <a:schemeClr val="dk1"/>
+          </a:fillRef>
+          <a:effectRef idx="1">
+            <a:schemeClr val="dk1"/>
+          </a:effectRef>
+          <a:fontRef idx="minor">
+            <a:schemeClr val="tx1"/>
+          </a:fontRef>
+        </p:style>
+      </p:cxnSp>
+      <p:sp>
+        <p:nvSpPr>
+          <p:cNvPr id="26" name="TextBox 25">
+            <a:extLst>
+              <a:ext uri="{FF2B5EF4-FFF2-40B4-BE49-F238E27FC236}">
+                <a16:creationId xmlns:a16="http://schemas.microsoft.com/office/drawing/2014/main" id="{C681AD48-C540-4054-1B64-A8AB61149579}"/>
+              </a:ext>
+            </a:extLst>
+          </p:cNvPr>
+          <p:cNvSpPr txBox="1"/>
+          <p:nvPr/>
+        </p:nvSpPr>
+        <p:spPr>
+          <a:xfrm>
+            <a:off x="5227402" y="1258300"/>
+            <a:ext cx="788999" cy="369332"/>
+          </a:xfrm>
+          <a:prstGeom prst="rect">
+            <a:avLst/>
+          </a:prstGeom>
+          <a:noFill/>
+        </p:spPr>
+        <p:txBody>
+          <a:bodyPr wrap="none" rtlCol="0">
+            <a:spAutoFit/>
+          </a:bodyPr>
+          <a:lstStyle/>
+          <a:p>
+            <a:r>
+              <a:rPr lang="en-GB" dirty="0"/>
+              <a:t>txt file</a:t>
+            </a:r>
+            <a:endParaRPr lang="en-US" dirty="0"/>
+          </a:p>
+        </p:txBody>
+      </p:sp>
+      <p:sp>
+        <p:nvSpPr>
+          <p:cNvPr id="54" name="Oval 53">
+            <a:extLst>
+              <a:ext uri="{FF2B5EF4-FFF2-40B4-BE49-F238E27FC236}">
+                <a16:creationId xmlns:a16="http://schemas.microsoft.com/office/drawing/2014/main" id="{01B9F478-7059-3F89-9ED5-DD4E99ECF84C}"/>
+              </a:ext>
+            </a:extLst>
+          </p:cNvPr>
+          <p:cNvSpPr/>
+          <p:nvPr/>
+        </p:nvSpPr>
+        <p:spPr>
+          <a:xfrm>
+            <a:off x="317481" y="6065258"/>
+            <a:ext cx="1952789" cy="731520"/>
+          </a:xfrm>
+          <a:prstGeom prst="ellipse">
+            <a:avLst/>
+          </a:prstGeom>
+          <a:solidFill>
+            <a:srgbClr val="FF0000"/>
+          </a:solidFill>
+        </p:spPr>
+        <p:style>
+          <a:lnRef idx="2">
+            <a:schemeClr val="accent4">
+              <a:shade val="15000"/>
+            </a:schemeClr>
+          </a:lnRef>
+          <a:fillRef idx="1">
+            <a:schemeClr val="accent4"/>
+          </a:fillRef>
+          <a:effectRef idx="0">
+            <a:schemeClr val="accent4"/>
+          </a:effectRef>
+          <a:fontRef idx="minor">
+            <a:schemeClr val="lt1"/>
+          </a:fontRef>
+        </p:style>
+        <p:txBody>
+          <a:bodyPr rtlCol="0" anchor="ctr"/>
+          <a:lstStyle/>
+          <a:p>
+            <a:pPr algn="ctr"/>
+            <a:r>
+              <a:rPr lang="es-CR" dirty="0"/>
+              <a:t>MOMF</a:t>
+            </a:r>
+          </a:p>
+          <a:p>
+            <a:pPr algn="ctr"/>
+            <a:r>
+              <a:rPr lang="es-CR" dirty="0" err="1"/>
+              <a:t>modernized</a:t>
+            </a:r>
+            <a:endParaRPr lang="en-US" dirty="0"/>
+          </a:p>
+        </p:txBody>
+      </p:sp>
+      <p:sp>
+        <p:nvSpPr>
+          <p:cNvPr id="56" name="Rectangle: Rounded Corners 55">
+            <a:extLst>
+              <a:ext uri="{FF2B5EF4-FFF2-40B4-BE49-F238E27FC236}">
+                <a16:creationId xmlns:a16="http://schemas.microsoft.com/office/drawing/2014/main" id="{169BC2E1-5628-B8C7-1633-9B3C4A1F9C11}"/>
+              </a:ext>
+            </a:extLst>
+          </p:cNvPr>
+          <p:cNvSpPr/>
+          <p:nvPr/>
+        </p:nvSpPr>
+        <p:spPr>
+          <a:xfrm>
+            <a:off x="3011966" y="3586464"/>
+            <a:ext cx="2239632" cy="1669551"/>
+          </a:xfrm>
+          <a:prstGeom prst="roundRect">
+            <a:avLst/>
+          </a:prstGeom>
+          <a:solidFill>
+            <a:schemeClr val="dk1">
+              <a:alpha val="50000"/>
+            </a:schemeClr>
+          </a:solidFill>
+          <a:ln>
+            <a:noFill/>
+          </a:ln>
+        </p:spPr>
+        <p:style>
+          <a:lnRef idx="0">
+            <a:scrgbClr r="0" g="0" b="0"/>
+          </a:lnRef>
+          <a:fillRef idx="0">
+            <a:scrgbClr r="0" g="0" b="0"/>
+          </a:fillRef>
+          <a:effectRef idx="0">
+            <a:scrgbClr r="0" g="0" b="0"/>
+          </a:effectRef>
+          <a:fontRef idx="minor">
+            <a:schemeClr val="lt1"/>
+          </a:fontRef>
+        </p:style>
+        <p:txBody>
+          <a:bodyPr rtlCol="0" anchor="ctr"/>
+          <a:lstStyle/>
+          <a:p>
+            <a:pPr algn="ctr"/>
+            <a:r>
+              <a:rPr lang="en-GB" dirty="0"/>
+              <a:t>Solver</a:t>
+            </a:r>
+          </a:p>
+          <a:p>
+            <a:pPr algn="r"/>
+            <a:r>
+              <a:rPr lang="en-GB" dirty="0"/>
+              <a:t>GLPK</a:t>
+            </a:r>
+          </a:p>
+          <a:p>
+            <a:pPr algn="r"/>
+            <a:r>
+              <a:rPr lang="en-GB" dirty="0"/>
+              <a:t>GLPK</a:t>
+            </a:r>
+          </a:p>
+          <a:p>
+            <a:pPr algn="r"/>
+            <a:r>
+              <a:rPr lang="en-GB" dirty="0"/>
+              <a:t>CBC</a:t>
+            </a:r>
+          </a:p>
+          <a:p>
+            <a:pPr algn="r"/>
+            <a:r>
+              <a:rPr lang="en-GB" dirty="0"/>
+              <a:t>CPLEX</a:t>
+            </a:r>
+            <a:endParaRPr lang="en-US" dirty="0"/>
+          </a:p>
+        </p:txBody>
+      </p:sp>
+      <p:sp>
+        <p:nvSpPr>
+          <p:cNvPr id="60" name="TextBox 59">
+            <a:extLst>
+              <a:ext uri="{FF2B5EF4-FFF2-40B4-BE49-F238E27FC236}">
+                <a16:creationId xmlns:a16="http://schemas.microsoft.com/office/drawing/2014/main" id="{C9817EF8-53A6-5300-A515-3AB8F19B86EF}"/>
+              </a:ext>
+            </a:extLst>
+          </p:cNvPr>
+          <p:cNvSpPr txBox="1"/>
+          <p:nvPr/>
+        </p:nvSpPr>
+        <p:spPr>
+          <a:xfrm>
+            <a:off x="2152325" y="4053577"/>
+            <a:ext cx="788999" cy="369332"/>
+          </a:xfrm>
+          <a:prstGeom prst="rect">
+            <a:avLst/>
+          </a:prstGeom>
+          <a:noFill/>
+        </p:spPr>
+        <p:txBody>
+          <a:bodyPr wrap="none" rtlCol="0">
+            <a:spAutoFit/>
+          </a:bodyPr>
+          <a:lstStyle/>
+          <a:p>
+            <a:r>
+              <a:rPr lang="en-GB" dirty="0"/>
+              <a:t>txt file</a:t>
+            </a:r>
+            <a:endParaRPr lang="en-US" dirty="0"/>
+          </a:p>
+        </p:txBody>
+      </p:sp>
+      <p:sp>
+        <p:nvSpPr>
+          <p:cNvPr id="61" name="Rectangle 60">
+            <a:extLst>
+              <a:ext uri="{FF2B5EF4-FFF2-40B4-BE49-F238E27FC236}">
+                <a16:creationId xmlns:a16="http://schemas.microsoft.com/office/drawing/2014/main" id="{5ACFDA1C-0C11-13B3-14B8-AEA2B9EABA30}"/>
+              </a:ext>
+            </a:extLst>
+          </p:cNvPr>
+          <p:cNvSpPr/>
+          <p:nvPr/>
+        </p:nvSpPr>
+        <p:spPr>
+          <a:xfrm>
+            <a:off x="6904849" y="3244949"/>
+            <a:ext cx="1728215" cy="603504"/>
+          </a:xfrm>
+          <a:prstGeom prst="rect">
+            <a:avLst/>
+          </a:prstGeom>
+          <a:solidFill>
+            <a:srgbClr val="FF0000"/>
+          </a:solidFill>
+        </p:spPr>
+        <p:style>
+          <a:lnRef idx="2">
+            <a:schemeClr val="accent4">
+              <a:shade val="15000"/>
+            </a:schemeClr>
+          </a:lnRef>
+          <a:fillRef idx="1">
+            <a:schemeClr val="accent4"/>
+          </a:fillRef>
+          <a:effectRef idx="0">
+            <a:schemeClr val="accent4"/>
+          </a:effectRef>
+          <a:fontRef idx="minor">
+            <a:schemeClr val="lt1"/>
+          </a:fontRef>
+        </p:style>
+        <p:txBody>
+          <a:bodyPr rtlCol="0" anchor="ctr"/>
+          <a:lstStyle/>
+          <a:p>
+            <a:pPr algn="ctr"/>
+            <a:r>
+              <a:rPr lang="en-GB" dirty="0" err="1"/>
+              <a:t>data_processor</a:t>
+            </a:r>
+            <a:endParaRPr lang="en-US" dirty="0"/>
+          </a:p>
+        </p:txBody>
+      </p:sp>
+      <p:cxnSp>
+        <p:nvCxnSpPr>
+          <p:cNvPr id="62" name="Connector: Elbow 61">
+            <a:extLst>
+              <a:ext uri="{FF2B5EF4-FFF2-40B4-BE49-F238E27FC236}">
+                <a16:creationId xmlns:a16="http://schemas.microsoft.com/office/drawing/2014/main" id="{5D5B9AA5-120B-36EF-3F20-91655BD7C2F9}"/>
+              </a:ext>
+            </a:extLst>
+          </p:cNvPr>
+          <p:cNvCxnSpPr>
+            <a:cxnSpLocks/>
+            <a:stCxn id="68" idx="1"/>
+            <a:endCxn id="61" idx="1"/>
+          </p:cNvCxnSpPr>
+          <p:nvPr/>
+        </p:nvCxnSpPr>
+        <p:spPr>
+          <a:xfrm rot="10800000" flipH="1">
+            <a:off x="5305819" y="3546702"/>
+            <a:ext cx="1599029" cy="601903"/>
+          </a:xfrm>
+          <a:prstGeom prst="bentConnector3">
+            <a:avLst>
+              <a:gd name="adj1" fmla="val 72924"/>
+            </a:avLst>
+          </a:prstGeom>
+          <a:ln>
+            <a:tailEnd type="triangle"/>
+          </a:ln>
+        </p:spPr>
+        <p:style>
+          <a:lnRef idx="2">
+            <a:schemeClr val="dk1"/>
+          </a:lnRef>
+          <a:fillRef idx="0">
+            <a:schemeClr val="dk1"/>
+          </a:fillRef>
+          <a:effectRef idx="1">
+            <a:schemeClr val="dk1"/>
+          </a:effectRef>
+          <a:fontRef idx="minor">
+            <a:schemeClr val="tx1"/>
+          </a:fontRef>
+        </p:style>
+      </p:cxnSp>
+      <p:sp>
+        <p:nvSpPr>
+          <p:cNvPr id="63" name="TextBox 62">
+            <a:extLst>
+              <a:ext uri="{FF2B5EF4-FFF2-40B4-BE49-F238E27FC236}">
+                <a16:creationId xmlns:a16="http://schemas.microsoft.com/office/drawing/2014/main" id="{049841D0-A985-CD94-F37E-A0D8D918A85A}"/>
+              </a:ext>
+            </a:extLst>
+          </p:cNvPr>
+          <p:cNvSpPr txBox="1"/>
+          <p:nvPr/>
+        </p:nvSpPr>
+        <p:spPr>
+          <a:xfrm>
+            <a:off x="5290910" y="3817463"/>
+            <a:ext cx="788999" cy="369332"/>
+          </a:xfrm>
+          <a:prstGeom prst="rect">
+            <a:avLst/>
+          </a:prstGeom>
+          <a:noFill/>
+        </p:spPr>
+        <p:txBody>
+          <a:bodyPr wrap="none" rtlCol="0">
+            <a:spAutoFit/>
+          </a:bodyPr>
+          <a:lstStyle/>
+          <a:p>
+            <a:r>
+              <a:rPr lang="en-GB" dirty="0"/>
+              <a:t>txt file</a:t>
+            </a:r>
+            <a:endParaRPr lang="en-US" dirty="0"/>
+          </a:p>
+        </p:txBody>
+      </p:sp>
+      <p:sp>
+        <p:nvSpPr>
+          <p:cNvPr id="64" name="Right Brace 63">
+            <a:extLst>
+              <a:ext uri="{FF2B5EF4-FFF2-40B4-BE49-F238E27FC236}">
+                <a16:creationId xmlns:a16="http://schemas.microsoft.com/office/drawing/2014/main" id="{68392505-348E-F697-0383-A8992EDAF16C}"/>
+              </a:ext>
+            </a:extLst>
+          </p:cNvPr>
+          <p:cNvSpPr/>
+          <p:nvPr/>
+        </p:nvSpPr>
+        <p:spPr>
+          <a:xfrm>
+            <a:off x="5044649" y="4326241"/>
+            <a:ext cx="297885" cy="777239"/>
+          </a:xfrm>
+          <a:prstGeom prst="rightBrace">
+            <a:avLst/>
+          </a:prstGeom>
+        </p:spPr>
+        <p:style>
+          <a:lnRef idx="2">
+            <a:schemeClr val="dk1"/>
+          </a:lnRef>
+          <a:fillRef idx="0">
+            <a:schemeClr val="dk1"/>
+          </a:fillRef>
+          <a:effectRef idx="1">
+            <a:schemeClr val="dk1"/>
+          </a:effectRef>
+          <a:fontRef idx="minor">
+            <a:schemeClr val="tx1"/>
+          </a:fontRef>
+        </p:style>
+        <p:txBody>
+          <a:bodyPr rtlCol="0" anchor="ctr"/>
+          <a:lstStyle/>
+          <a:p>
+            <a:pPr algn="ctr"/>
+            <a:endParaRPr lang="en-US"/>
+          </a:p>
+        </p:txBody>
+      </p:sp>
+      <p:sp>
+        <p:nvSpPr>
+          <p:cNvPr id="66" name="Rectangle: Rounded Corners 65">
+            <a:extLst>
+              <a:ext uri="{FF2B5EF4-FFF2-40B4-BE49-F238E27FC236}">
+                <a16:creationId xmlns:a16="http://schemas.microsoft.com/office/drawing/2014/main" id="{CDA76897-89E7-9BA0-96DD-587806A27227}"/>
+              </a:ext>
+            </a:extLst>
+          </p:cNvPr>
+          <p:cNvSpPr/>
+          <p:nvPr/>
+        </p:nvSpPr>
+        <p:spPr>
+          <a:xfrm>
+            <a:off x="6080898" y="4431582"/>
+            <a:ext cx="1092046" cy="557784"/>
+          </a:xfrm>
+          <a:prstGeom prst="roundRect">
+            <a:avLst/>
+          </a:prstGeom>
+          <a:solidFill>
+            <a:schemeClr val="dk1">
+              <a:alpha val="50000"/>
+            </a:schemeClr>
+          </a:solidFill>
+          <a:ln>
+            <a:noFill/>
+          </a:ln>
+        </p:spPr>
+        <p:style>
+          <a:lnRef idx="0">
+            <a:scrgbClr r="0" g="0" b="0"/>
+          </a:lnRef>
+          <a:fillRef idx="0">
+            <a:scrgbClr r="0" g="0" b="0"/>
+          </a:fillRef>
+          <a:effectRef idx="0">
+            <a:scrgbClr r="0" g="0" b="0"/>
+          </a:effectRef>
+          <a:fontRef idx="minor">
+            <a:schemeClr val="lt1"/>
+          </a:fontRef>
+        </p:style>
+        <p:txBody>
+          <a:bodyPr rtlCol="0" anchor="ctr"/>
+          <a:lstStyle/>
+          <a:p>
+            <a:pPr algn="ctr"/>
+            <a:r>
+              <a:rPr lang="en-GB" dirty="0" err="1"/>
+              <a:t>Otoole</a:t>
+            </a:r>
+            <a:endParaRPr lang="en-US" dirty="0"/>
+          </a:p>
+        </p:txBody>
+      </p:sp>
+      <p:sp>
+        <p:nvSpPr>
+          <p:cNvPr id="67" name="TextBox 66">
+            <a:extLst>
+              <a:ext uri="{FF2B5EF4-FFF2-40B4-BE49-F238E27FC236}">
+                <a16:creationId xmlns:a16="http://schemas.microsoft.com/office/drawing/2014/main" id="{487FFF74-74CA-E188-0445-E256F91CC319}"/>
+              </a:ext>
+            </a:extLst>
+          </p:cNvPr>
+          <p:cNvSpPr txBox="1"/>
+          <p:nvPr/>
+        </p:nvSpPr>
+        <p:spPr>
+          <a:xfrm>
+            <a:off x="5215993" y="4739858"/>
+            <a:ext cx="833883" cy="369332"/>
+          </a:xfrm>
+          <a:prstGeom prst="rect">
+            <a:avLst/>
+          </a:prstGeom>
+          <a:noFill/>
+        </p:spPr>
+        <p:txBody>
+          <a:bodyPr wrap="none" rtlCol="0">
+            <a:spAutoFit/>
+          </a:bodyPr>
+          <a:lstStyle/>
+          <a:p>
+            <a:r>
+              <a:rPr lang="en-GB" dirty="0"/>
+              <a:t>sol file</a:t>
+            </a:r>
+            <a:endParaRPr lang="en-US" dirty="0"/>
+          </a:p>
+        </p:txBody>
+      </p:sp>
+      <p:sp>
+        <p:nvSpPr>
+          <p:cNvPr id="68" name="Right Brace 67">
+            <a:extLst>
+              <a:ext uri="{FF2B5EF4-FFF2-40B4-BE49-F238E27FC236}">
+                <a16:creationId xmlns:a16="http://schemas.microsoft.com/office/drawing/2014/main" id="{122A883F-FA70-5635-F8BE-B7416484C4D7}"/>
+              </a:ext>
+            </a:extLst>
+          </p:cNvPr>
+          <p:cNvSpPr/>
+          <p:nvPr/>
+        </p:nvSpPr>
+        <p:spPr>
+          <a:xfrm>
+            <a:off x="4981435" y="3994297"/>
+            <a:ext cx="324385" cy="308614"/>
+          </a:xfrm>
+          <a:prstGeom prst="rightBrace">
+            <a:avLst/>
+          </a:prstGeom>
+        </p:spPr>
+        <p:style>
+          <a:lnRef idx="2">
+            <a:schemeClr val="dk1"/>
+          </a:lnRef>
+          <a:fillRef idx="0">
+            <a:schemeClr val="dk1"/>
+          </a:fillRef>
+          <a:effectRef idx="1">
+            <a:schemeClr val="dk1"/>
+          </a:effectRef>
+          <a:fontRef idx="minor">
+            <a:schemeClr val="tx1"/>
+          </a:fontRef>
+        </p:style>
+        <p:txBody>
+          <a:bodyPr rtlCol="0" anchor="ctr"/>
+          <a:lstStyle/>
+          <a:p>
+            <a:pPr algn="ctr"/>
+            <a:endParaRPr lang="en-US"/>
+          </a:p>
+        </p:txBody>
+      </p:sp>
+      <p:sp>
+        <p:nvSpPr>
+          <p:cNvPr id="75" name="Rectangle: Rounded Corners 74">
+            <a:extLst>
+              <a:ext uri="{FF2B5EF4-FFF2-40B4-BE49-F238E27FC236}">
+                <a16:creationId xmlns:a16="http://schemas.microsoft.com/office/drawing/2014/main" id="{9AF67ABC-BC8C-BE09-53CD-545C85D34715}"/>
+              </a:ext>
+            </a:extLst>
+          </p:cNvPr>
+          <p:cNvSpPr/>
+          <p:nvPr/>
+        </p:nvSpPr>
+        <p:spPr>
+          <a:xfrm>
+            <a:off x="3471337" y="960120"/>
+            <a:ext cx="1673352" cy="731520"/>
+          </a:xfrm>
+          <a:prstGeom prst="roundRect">
+            <a:avLst/>
+          </a:prstGeom>
+          <a:solidFill>
+            <a:schemeClr val="dk1">
+              <a:alpha val="50000"/>
+            </a:schemeClr>
+          </a:solidFill>
+          <a:ln>
+            <a:noFill/>
+          </a:ln>
+        </p:spPr>
+        <p:style>
+          <a:lnRef idx="0">
+            <a:scrgbClr r="0" g="0" b="0"/>
+          </a:lnRef>
+          <a:fillRef idx="0">
+            <a:scrgbClr r="0" g="0" b="0"/>
+          </a:fillRef>
+          <a:effectRef idx="0">
+            <a:scrgbClr r="0" g="0" b="0"/>
+          </a:effectRef>
+          <a:fontRef idx="minor">
+            <a:schemeClr val="lt1"/>
+          </a:fontRef>
+        </p:style>
+        <p:txBody>
+          <a:bodyPr rtlCol="0" anchor="ctr"/>
+          <a:lstStyle/>
+          <a:p>
+            <a:pPr algn="ctr"/>
+            <a:r>
+              <a:rPr lang="en-GB" dirty="0"/>
+              <a:t>Solver</a:t>
+            </a:r>
+          </a:p>
+          <a:p>
+            <a:pPr algn="ctr"/>
+            <a:r>
+              <a:rPr lang="en-GB" dirty="0"/>
+              <a:t>GLPK</a:t>
+            </a:r>
+            <a:endParaRPr lang="en-US" dirty="0"/>
+          </a:p>
+        </p:txBody>
+      </p:sp>
+      <p:sp>
+        <p:nvSpPr>
+          <p:cNvPr id="101" name="Rectangle 100">
+            <a:extLst>
+              <a:ext uri="{FF2B5EF4-FFF2-40B4-BE49-F238E27FC236}">
+                <a16:creationId xmlns:a16="http://schemas.microsoft.com/office/drawing/2014/main" id="{B16767A1-5D43-3018-91C0-FC9074A6C364}"/>
+              </a:ext>
+            </a:extLst>
+          </p:cNvPr>
+          <p:cNvSpPr/>
+          <p:nvPr/>
+        </p:nvSpPr>
+        <p:spPr>
+          <a:xfrm>
+            <a:off x="91440" y="5125066"/>
+            <a:ext cx="2404872" cy="505709"/>
+          </a:xfrm>
+          <a:prstGeom prst="rect">
+            <a:avLst/>
+          </a:prstGeom>
+          <a:solidFill>
+            <a:srgbClr val="FF0000"/>
+          </a:solidFill>
+        </p:spPr>
+        <p:style>
+          <a:lnRef idx="2">
+            <a:schemeClr val="accent4">
+              <a:shade val="15000"/>
+            </a:schemeClr>
+          </a:lnRef>
+          <a:fillRef idx="1">
+            <a:schemeClr val="accent4"/>
+          </a:fillRef>
+          <a:effectRef idx="0">
+            <a:schemeClr val="accent4"/>
+          </a:effectRef>
+          <a:fontRef idx="minor">
+            <a:schemeClr val="lt1"/>
+          </a:fontRef>
+        </p:style>
+        <p:txBody>
+          <a:bodyPr rtlCol="0" anchor="ctr"/>
+          <a:lstStyle/>
+          <a:p>
+            <a:pPr algn="ctr"/>
+            <a:r>
+              <a:rPr lang="es-CR" dirty="0" err="1"/>
+              <a:t>Function</a:t>
+            </a:r>
+            <a:r>
+              <a:rPr lang="en-GB" dirty="0"/>
+              <a:t>_</a:t>
+            </a:r>
+            <a:r>
+              <a:rPr lang="en-GB" dirty="0" err="1"/>
+              <a:t>C_Mathprog</a:t>
+            </a:r>
+            <a:endParaRPr lang="en-US" dirty="0"/>
+          </a:p>
+        </p:txBody>
+      </p:sp>
+      <p:sp>
+        <p:nvSpPr>
+          <p:cNvPr id="102" name="Rectangle 101">
+            <a:extLst>
+              <a:ext uri="{FF2B5EF4-FFF2-40B4-BE49-F238E27FC236}">
+                <a16:creationId xmlns:a16="http://schemas.microsoft.com/office/drawing/2014/main" id="{3FA178A6-F774-DF9C-1DA8-880EAE13C072}"/>
+              </a:ext>
+            </a:extLst>
+          </p:cNvPr>
+          <p:cNvSpPr/>
+          <p:nvPr/>
+        </p:nvSpPr>
+        <p:spPr>
+          <a:xfrm>
+            <a:off x="457199" y="4161782"/>
+            <a:ext cx="1673352" cy="517423"/>
+          </a:xfrm>
+          <a:prstGeom prst="rect">
+            <a:avLst/>
+          </a:prstGeom>
+          <a:solidFill>
+            <a:srgbClr val="FF0000"/>
+          </a:solidFill>
+        </p:spPr>
+        <p:style>
+          <a:lnRef idx="2">
+            <a:schemeClr val="accent4">
+              <a:shade val="15000"/>
+            </a:schemeClr>
+          </a:lnRef>
+          <a:fillRef idx="1">
+            <a:schemeClr val="accent4"/>
+          </a:fillRef>
+          <a:effectRef idx="0">
+            <a:schemeClr val="accent4"/>
+          </a:effectRef>
+          <a:fontRef idx="minor">
+            <a:schemeClr val="lt1"/>
+          </a:fontRef>
+        </p:style>
+        <p:txBody>
+          <a:bodyPr rtlCol="0" anchor="ctr"/>
+          <a:lstStyle/>
+          <a:p>
+            <a:pPr algn="ctr"/>
+            <a:r>
+              <a:rPr lang="en-GB" dirty="0" err="1"/>
+              <a:t>main_executer</a:t>
+            </a:r>
+            <a:endParaRPr lang="en-US" dirty="0"/>
+          </a:p>
+        </p:txBody>
+      </p:sp>
+      <p:cxnSp>
+        <p:nvCxnSpPr>
+          <p:cNvPr id="104" name="Straight Arrow Connector 103">
+            <a:extLst>
+              <a:ext uri="{FF2B5EF4-FFF2-40B4-BE49-F238E27FC236}">
+                <a16:creationId xmlns:a16="http://schemas.microsoft.com/office/drawing/2014/main" id="{1CA2E1CA-CE66-D938-4AC1-E26DBD29DD9E}"/>
+              </a:ext>
+            </a:extLst>
+          </p:cNvPr>
+          <p:cNvCxnSpPr>
+            <a:stCxn id="54" idx="0"/>
+            <a:endCxn id="101" idx="2"/>
+          </p:cNvCxnSpPr>
+          <p:nvPr/>
+        </p:nvCxnSpPr>
+        <p:spPr>
+          <a:xfrm flipV="1">
+            <a:off x="1293876" y="5630775"/>
+            <a:ext cx="0" cy="434483"/>
+          </a:xfrm>
+          <a:prstGeom prst="straightConnector1">
+            <a:avLst/>
+          </a:prstGeom>
+          <a:ln>
+            <a:tailEnd type="triangle"/>
+          </a:ln>
+        </p:spPr>
+        <p:style>
+          <a:lnRef idx="2">
+            <a:schemeClr val="dk1"/>
+          </a:lnRef>
+          <a:fillRef idx="0">
+            <a:schemeClr val="dk1"/>
+          </a:fillRef>
+          <a:effectRef idx="1">
+            <a:schemeClr val="dk1"/>
+          </a:effectRef>
+          <a:fontRef idx="minor">
+            <a:schemeClr val="tx1"/>
+          </a:fontRef>
+        </p:style>
+      </p:cxnSp>
+      <p:cxnSp>
+        <p:nvCxnSpPr>
+          <p:cNvPr id="107" name="Straight Arrow Connector 106">
+            <a:extLst>
+              <a:ext uri="{FF2B5EF4-FFF2-40B4-BE49-F238E27FC236}">
+                <a16:creationId xmlns:a16="http://schemas.microsoft.com/office/drawing/2014/main" id="{A2A2BC94-D95D-A68F-1BE0-D891B87ECE7F}"/>
+              </a:ext>
+            </a:extLst>
+          </p:cNvPr>
+          <p:cNvCxnSpPr>
+            <a:stCxn id="101" idx="0"/>
+            <a:endCxn id="102" idx="2"/>
+          </p:cNvCxnSpPr>
+          <p:nvPr/>
+        </p:nvCxnSpPr>
+        <p:spPr>
+          <a:xfrm flipH="1" flipV="1">
+            <a:off x="1293875" y="4679205"/>
+            <a:ext cx="1" cy="445861"/>
+          </a:xfrm>
+          <a:prstGeom prst="straightConnector1">
+            <a:avLst/>
+          </a:prstGeom>
+          <a:ln>
+            <a:tailEnd type="triangle"/>
+          </a:ln>
+        </p:spPr>
+        <p:style>
+          <a:lnRef idx="2">
+            <a:schemeClr val="dk1"/>
+          </a:lnRef>
+          <a:fillRef idx="0">
+            <a:schemeClr val="dk1"/>
+          </a:fillRef>
+          <a:effectRef idx="1">
+            <a:schemeClr val="dk1"/>
+          </a:effectRef>
+          <a:fontRef idx="minor">
+            <a:schemeClr val="tx1"/>
+          </a:fontRef>
+        </p:style>
+      </p:cxnSp>
+      <p:cxnSp>
+        <p:nvCxnSpPr>
+          <p:cNvPr id="110" name="Straight Arrow Connector 109">
+            <a:extLst>
+              <a:ext uri="{FF2B5EF4-FFF2-40B4-BE49-F238E27FC236}">
+                <a16:creationId xmlns:a16="http://schemas.microsoft.com/office/drawing/2014/main" id="{370027EE-FF69-9354-C1BE-5BB5A9D4EFE2}"/>
+              </a:ext>
+            </a:extLst>
+          </p:cNvPr>
+          <p:cNvCxnSpPr>
+            <a:stCxn id="102" idx="3"/>
+          </p:cNvCxnSpPr>
+          <p:nvPr/>
+        </p:nvCxnSpPr>
+        <p:spPr>
+          <a:xfrm flipV="1">
+            <a:off x="2130551" y="4414284"/>
+            <a:ext cx="881416" cy="6210"/>
+          </a:xfrm>
+          <a:prstGeom prst="straightConnector1">
+            <a:avLst/>
+          </a:prstGeom>
+          <a:ln>
+            <a:tailEnd type="triangle"/>
+          </a:ln>
+        </p:spPr>
+        <p:style>
+          <a:lnRef idx="2">
+            <a:schemeClr val="dk1"/>
+          </a:lnRef>
+          <a:fillRef idx="0">
+            <a:schemeClr val="dk1"/>
+          </a:fillRef>
+          <a:effectRef idx="1">
+            <a:schemeClr val="dk1"/>
+          </a:effectRef>
+          <a:fontRef idx="minor">
+            <a:schemeClr val="tx1"/>
+          </a:fontRef>
+        </p:style>
+      </p:cxnSp>
+      <p:sp>
+        <p:nvSpPr>
+          <p:cNvPr id="128" name="Rectangle: Single Corner Snipped 127">
+            <a:extLst>
+              <a:ext uri="{FF2B5EF4-FFF2-40B4-BE49-F238E27FC236}">
+                <a16:creationId xmlns:a16="http://schemas.microsoft.com/office/drawing/2014/main" id="{244E549C-7842-C6A4-124E-709DAF3ABC85}"/>
+              </a:ext>
+            </a:extLst>
+          </p:cNvPr>
+          <p:cNvSpPr/>
+          <p:nvPr/>
+        </p:nvSpPr>
+        <p:spPr>
+          <a:xfrm>
+            <a:off x="7468083" y="1524227"/>
+            <a:ext cx="2724912" cy="554002"/>
+          </a:xfrm>
+          <a:prstGeom prst="snip1Rect">
+            <a:avLst/>
+          </a:prstGeom>
+          <a:solidFill>
+            <a:srgbClr val="FFFF00"/>
+          </a:solidFill>
+        </p:spPr>
+        <p:style>
+          <a:lnRef idx="2">
+            <a:schemeClr val="accent1">
+              <a:shade val="15000"/>
+            </a:schemeClr>
+          </a:lnRef>
+          <a:fillRef idx="1">
+            <a:schemeClr val="accent1"/>
+          </a:fillRef>
+          <a:effectRef idx="0">
+            <a:schemeClr val="accent1"/>
+          </a:effectRef>
+          <a:fontRef idx="minor">
+            <a:schemeClr val="lt1"/>
+          </a:fontRef>
+        </p:style>
+        <p:txBody>
+          <a:bodyPr rtlCol="0" anchor="ctr"/>
+          <a:lstStyle/>
+          <a:p>
+            <a:pPr algn="ctr"/>
+            <a:r>
+              <a:rPr lang="en-US" dirty="0">
+                <a:ln w="0"/>
+                <a:solidFill>
+                  <a:schemeClr val="tx1"/>
+                </a:solidFill>
+                <a:effectLst>
+                  <a:outerShdw blurRad="38100" dist="19050" dir="2700000" algn="tl" rotWithShape="0">
+                    <a:schemeClr val="dk1">
+                      <a:alpha val="40000"/>
+                    </a:schemeClr>
+                  </a:outerShdw>
+                </a:effectLst>
+              </a:rPr>
+              <a:t>compare_txt_inputs.py</a:t>
+            </a:r>
+          </a:p>
+        </p:txBody>
+      </p:sp>
+      <p:sp>
+        <p:nvSpPr>
+          <p:cNvPr id="129" name="Right Brace 128">
+            <a:extLst>
+              <a:ext uri="{FF2B5EF4-FFF2-40B4-BE49-F238E27FC236}">
+                <a16:creationId xmlns:a16="http://schemas.microsoft.com/office/drawing/2014/main" id="{EE4A86EF-FA59-FF7C-6FC2-6F73737D6D0B}"/>
+              </a:ext>
+            </a:extLst>
+          </p:cNvPr>
+          <p:cNvSpPr/>
+          <p:nvPr/>
+        </p:nvSpPr>
+        <p:spPr>
+          <a:xfrm>
+            <a:off x="5874016" y="1325880"/>
+            <a:ext cx="408002" cy="2776809"/>
+          </a:xfrm>
+          <a:prstGeom prst="rightBrace">
+            <a:avLst/>
+          </a:prstGeom>
+          <a:ln w="19050" cap="flat" cmpd="sng" algn="ctr">
+            <a:solidFill>
+              <a:schemeClr val="dk1"/>
+            </a:solidFill>
+            <a:prstDash val="dash"/>
+            <a:round/>
+            <a:headEnd type="none" w="med" len="med"/>
+            <a:tailEnd type="none" w="med" len="med"/>
+          </a:ln>
+        </p:spPr>
+        <p:style>
+          <a:lnRef idx="0">
+            <a:scrgbClr r="0" g="0" b="0"/>
+          </a:lnRef>
+          <a:fillRef idx="0">
+            <a:scrgbClr r="0" g="0" b="0"/>
+          </a:fillRef>
+          <a:effectRef idx="0">
+            <a:scrgbClr r="0" g="0" b="0"/>
+          </a:effectRef>
+          <a:fontRef idx="minor">
+            <a:schemeClr val="tx1"/>
+          </a:fontRef>
+        </p:style>
+        <p:txBody>
+          <a:bodyPr rtlCol="0" anchor="ctr"/>
+          <a:lstStyle/>
+          <a:p>
+            <a:pPr algn="ctr"/>
+            <a:endParaRPr lang="en-US"/>
+          </a:p>
+        </p:txBody>
+      </p:sp>
+      <p:cxnSp>
+        <p:nvCxnSpPr>
+          <p:cNvPr id="143" name="Connector: Elbow 142">
+            <a:extLst>
+              <a:ext uri="{FF2B5EF4-FFF2-40B4-BE49-F238E27FC236}">
+                <a16:creationId xmlns:a16="http://schemas.microsoft.com/office/drawing/2014/main" id="{E6055BFF-CC29-EEF5-48E8-93DF3B974CDB}"/>
+              </a:ext>
+            </a:extLst>
+          </p:cNvPr>
+          <p:cNvCxnSpPr>
+            <a:cxnSpLocks/>
+            <a:stCxn id="129" idx="1"/>
+            <a:endCxn id="128" idx="1"/>
+          </p:cNvCxnSpPr>
+          <p:nvPr/>
+        </p:nvCxnSpPr>
+        <p:spPr>
+          <a:xfrm rot="10800000" flipH="1">
+            <a:off x="6282017" y="2078229"/>
+            <a:ext cx="2548521" cy="636056"/>
+          </a:xfrm>
+          <a:prstGeom prst="bentConnector4">
+            <a:avLst>
+              <a:gd name="adj1" fmla="val 24894"/>
+              <a:gd name="adj2" fmla="val 233"/>
+            </a:avLst>
+          </a:prstGeom>
+          <a:ln w="19050" cap="flat" cmpd="sng" algn="ctr">
+            <a:solidFill>
+              <a:schemeClr val="dk1"/>
+            </a:solidFill>
+            <a:prstDash val="dash"/>
+            <a:round/>
+            <a:headEnd type="none" w="med" len="med"/>
+            <a:tailEnd type="none" w="med" len="med"/>
+          </a:ln>
+        </p:spPr>
+        <p:style>
+          <a:lnRef idx="0">
+            <a:scrgbClr r="0" g="0" b="0"/>
+          </a:lnRef>
+          <a:fillRef idx="0">
+            <a:scrgbClr r="0" g="0" b="0"/>
+          </a:fillRef>
+          <a:effectRef idx="0">
+            <a:scrgbClr r="0" g="0" b="0"/>
+          </a:effectRef>
+          <a:fontRef idx="minor">
+            <a:schemeClr val="tx1"/>
+          </a:fontRef>
+        </p:style>
+      </p:cxnSp>
+      <p:sp>
+        <p:nvSpPr>
+          <p:cNvPr id="146" name="Rectangle: Diagonal Corners Snipped 145">
+            <a:extLst>
+              <a:ext uri="{FF2B5EF4-FFF2-40B4-BE49-F238E27FC236}">
+                <a16:creationId xmlns:a16="http://schemas.microsoft.com/office/drawing/2014/main" id="{5295ABBC-ECC0-07E6-B598-28B1FF205C69}"/>
+              </a:ext>
+            </a:extLst>
+          </p:cNvPr>
+          <p:cNvSpPr/>
+          <p:nvPr/>
+        </p:nvSpPr>
+        <p:spPr>
+          <a:xfrm>
+            <a:off x="9396122" y="450534"/>
+            <a:ext cx="1097280" cy="484632"/>
+          </a:xfrm>
+          <a:prstGeom prst="snip2DiagRect">
+            <a:avLst/>
+          </a:prstGeom>
+        </p:spPr>
+        <p:style>
+          <a:lnRef idx="2">
+            <a:schemeClr val="accent6">
+              <a:shade val="15000"/>
+            </a:schemeClr>
+          </a:lnRef>
+          <a:fillRef idx="1">
+            <a:schemeClr val="accent6"/>
+          </a:fillRef>
+          <a:effectRef idx="0">
+            <a:schemeClr val="accent6"/>
+          </a:effectRef>
+          <a:fontRef idx="minor">
+            <a:schemeClr val="lt1"/>
+          </a:fontRef>
+        </p:style>
+        <p:txBody>
+          <a:bodyPr rtlCol="0" anchor="ctr"/>
+          <a:lstStyle/>
+          <a:p>
+            <a:pPr algn="ctr"/>
+            <a:r>
+              <a:rPr lang="en-GB" dirty="0"/>
+              <a:t>Outputs</a:t>
+            </a:r>
+            <a:endParaRPr lang="en-US" dirty="0"/>
+          </a:p>
+        </p:txBody>
+      </p:sp>
+      <p:cxnSp>
+        <p:nvCxnSpPr>
+          <p:cNvPr id="148" name="Connector: Elbow 147">
+            <a:extLst>
+              <a:ext uri="{FF2B5EF4-FFF2-40B4-BE49-F238E27FC236}">
+                <a16:creationId xmlns:a16="http://schemas.microsoft.com/office/drawing/2014/main" id="{7181E3F0-13ED-6313-189E-F1364E1A23D1}"/>
+              </a:ext>
+            </a:extLst>
+          </p:cNvPr>
+          <p:cNvCxnSpPr>
+            <a:stCxn id="16" idx="3"/>
+            <a:endCxn id="146" idx="2"/>
+          </p:cNvCxnSpPr>
+          <p:nvPr/>
+        </p:nvCxnSpPr>
+        <p:spPr>
+          <a:xfrm>
+            <a:off x="8241360" y="569406"/>
+            <a:ext cx="1154762" cy="123444"/>
+          </a:xfrm>
+          <a:prstGeom prst="bentConnector3">
+            <a:avLst/>
+          </a:prstGeom>
+          <a:ln>
+            <a:tailEnd type="triangle"/>
+          </a:ln>
+        </p:spPr>
+        <p:style>
+          <a:lnRef idx="2">
+            <a:schemeClr val="dk1"/>
+          </a:lnRef>
+          <a:fillRef idx="0">
+            <a:schemeClr val="dk1"/>
+          </a:fillRef>
+          <a:effectRef idx="1">
+            <a:schemeClr val="dk1"/>
+          </a:effectRef>
+          <a:fontRef idx="minor">
+            <a:schemeClr val="tx1"/>
+          </a:fontRef>
+        </p:style>
+      </p:cxnSp>
+      <p:sp>
+        <p:nvSpPr>
+          <p:cNvPr id="150" name="TextBox 149">
+            <a:extLst>
+              <a:ext uri="{FF2B5EF4-FFF2-40B4-BE49-F238E27FC236}">
+                <a16:creationId xmlns:a16="http://schemas.microsoft.com/office/drawing/2014/main" id="{02858EAA-2AF0-9360-9E52-CC5EF0CC9994}"/>
+              </a:ext>
+            </a:extLst>
+          </p:cNvPr>
+          <p:cNvSpPr txBox="1"/>
+          <p:nvPr/>
+        </p:nvSpPr>
+        <p:spPr>
+          <a:xfrm>
+            <a:off x="8458200" y="157141"/>
+            <a:ext cx="871136" cy="369332"/>
+          </a:xfrm>
+          <a:prstGeom prst="rect">
+            <a:avLst/>
+          </a:prstGeom>
+          <a:noFill/>
+        </p:spPr>
+        <p:txBody>
+          <a:bodyPr wrap="none" rtlCol="0">
+            <a:spAutoFit/>
+          </a:bodyPr>
+          <a:lstStyle/>
+          <a:p>
+            <a:r>
+              <a:rPr lang="en-GB" dirty="0"/>
+              <a:t>csv file</a:t>
+            </a:r>
+            <a:endParaRPr lang="en-US" dirty="0"/>
+          </a:p>
+        </p:txBody>
+      </p:sp>
+      <p:sp>
+        <p:nvSpPr>
+          <p:cNvPr id="151" name="Rectangle: Diagonal Corners Snipped 150">
+            <a:extLst>
+              <a:ext uri="{FF2B5EF4-FFF2-40B4-BE49-F238E27FC236}">
+                <a16:creationId xmlns:a16="http://schemas.microsoft.com/office/drawing/2014/main" id="{58FB614F-13CA-5B42-8813-8328C7E78849}"/>
+              </a:ext>
+            </a:extLst>
+          </p:cNvPr>
+          <p:cNvSpPr/>
+          <p:nvPr/>
+        </p:nvSpPr>
+        <p:spPr>
+          <a:xfrm>
+            <a:off x="9493946" y="3363821"/>
+            <a:ext cx="1097280" cy="484632"/>
+          </a:xfrm>
+          <a:prstGeom prst="snip2DiagRect">
+            <a:avLst/>
+          </a:prstGeom>
+        </p:spPr>
+        <p:style>
+          <a:lnRef idx="2">
+            <a:schemeClr val="accent6">
+              <a:shade val="15000"/>
+            </a:schemeClr>
+          </a:lnRef>
+          <a:fillRef idx="1">
+            <a:schemeClr val="accent6"/>
+          </a:fillRef>
+          <a:effectRef idx="0">
+            <a:schemeClr val="accent6"/>
+          </a:effectRef>
+          <a:fontRef idx="minor">
+            <a:schemeClr val="lt1"/>
+          </a:fontRef>
+        </p:style>
+        <p:txBody>
+          <a:bodyPr rtlCol="0" anchor="ctr"/>
+          <a:lstStyle/>
+          <a:p>
+            <a:pPr algn="ctr"/>
+            <a:r>
+              <a:rPr lang="en-GB" dirty="0"/>
+              <a:t>Outputs</a:t>
+            </a:r>
+            <a:endParaRPr lang="en-US" dirty="0"/>
+          </a:p>
+        </p:txBody>
+      </p:sp>
+      <p:cxnSp>
+        <p:nvCxnSpPr>
+          <p:cNvPr id="152" name="Connector: Elbow 151">
+            <a:extLst>
+              <a:ext uri="{FF2B5EF4-FFF2-40B4-BE49-F238E27FC236}">
+                <a16:creationId xmlns:a16="http://schemas.microsoft.com/office/drawing/2014/main" id="{4FCC5C43-3FE8-7DAF-D9A5-29FC6394A382}"/>
+              </a:ext>
+            </a:extLst>
+          </p:cNvPr>
+          <p:cNvCxnSpPr>
+            <a:cxnSpLocks/>
+            <a:stCxn id="61" idx="3"/>
+            <a:endCxn id="151" idx="2"/>
+          </p:cNvCxnSpPr>
+          <p:nvPr/>
+        </p:nvCxnSpPr>
+        <p:spPr>
+          <a:xfrm>
+            <a:off x="8633064" y="3546701"/>
+            <a:ext cx="860882" cy="59436"/>
+          </a:xfrm>
+          <a:prstGeom prst="bentConnector3">
+            <a:avLst/>
+          </a:prstGeom>
+          <a:ln>
+            <a:tailEnd type="triangle"/>
+          </a:ln>
+        </p:spPr>
+        <p:style>
+          <a:lnRef idx="2">
+            <a:schemeClr val="dk1"/>
+          </a:lnRef>
+          <a:fillRef idx="0">
+            <a:schemeClr val="dk1"/>
+          </a:fillRef>
+          <a:effectRef idx="1">
+            <a:schemeClr val="dk1"/>
+          </a:effectRef>
+          <a:fontRef idx="minor">
+            <a:schemeClr val="tx1"/>
+          </a:fontRef>
+        </p:style>
+      </p:cxnSp>
+      <p:sp>
+        <p:nvSpPr>
+          <p:cNvPr id="153" name="TextBox 152">
+            <a:extLst>
+              <a:ext uri="{FF2B5EF4-FFF2-40B4-BE49-F238E27FC236}">
+                <a16:creationId xmlns:a16="http://schemas.microsoft.com/office/drawing/2014/main" id="{68C483D7-1E7A-CE95-FC00-A98628EEBCD8}"/>
+              </a:ext>
+            </a:extLst>
+          </p:cNvPr>
+          <p:cNvSpPr txBox="1"/>
+          <p:nvPr/>
+        </p:nvSpPr>
+        <p:spPr>
+          <a:xfrm>
+            <a:off x="8639248" y="3158039"/>
+            <a:ext cx="1048512" cy="369332"/>
+          </a:xfrm>
+          <a:prstGeom prst="rect">
+            <a:avLst/>
+          </a:prstGeom>
+          <a:noFill/>
+        </p:spPr>
+        <p:txBody>
+          <a:bodyPr wrap="square" rtlCol="0">
+            <a:spAutoFit/>
+          </a:bodyPr>
+          <a:lstStyle/>
+          <a:p>
+            <a:r>
+              <a:rPr lang="en-GB" dirty="0"/>
+              <a:t>csv file</a:t>
+            </a:r>
+            <a:endParaRPr lang="en-US" dirty="0"/>
+          </a:p>
+        </p:txBody>
+      </p:sp>
+      <p:sp>
+        <p:nvSpPr>
+          <p:cNvPr id="156" name="Hexagon 155">
+            <a:extLst>
+              <a:ext uri="{FF2B5EF4-FFF2-40B4-BE49-F238E27FC236}">
+                <a16:creationId xmlns:a16="http://schemas.microsoft.com/office/drawing/2014/main" id="{4251A129-DC75-F524-9BE6-103BCBD0F0E6}"/>
+              </a:ext>
+            </a:extLst>
+          </p:cNvPr>
+          <p:cNvSpPr/>
+          <p:nvPr/>
+        </p:nvSpPr>
+        <p:spPr>
+          <a:xfrm>
+            <a:off x="2781441" y="6155233"/>
+            <a:ext cx="3595481" cy="473406"/>
+          </a:xfrm>
+          <a:prstGeom prst="hexagon">
+            <a:avLst/>
+          </a:prstGeom>
+          <a:solidFill>
+            <a:srgbClr val="FF0000"/>
+          </a:solidFill>
+        </p:spPr>
+        <p:style>
+          <a:lnRef idx="2">
+            <a:schemeClr val="accent1">
+              <a:shade val="15000"/>
+            </a:schemeClr>
+          </a:lnRef>
+          <a:fillRef idx="1">
+            <a:schemeClr val="accent1"/>
+          </a:fillRef>
+          <a:effectRef idx="0">
+            <a:schemeClr val="accent1"/>
+          </a:effectRef>
+          <a:fontRef idx="minor">
+            <a:schemeClr val="lt1"/>
+          </a:fontRef>
+        </p:style>
+        <p:txBody>
+          <a:bodyPr rtlCol="0" anchor="ctr"/>
+          <a:lstStyle/>
+          <a:p>
+            <a:pPr algn="ctr"/>
+            <a:r>
+              <a:rPr lang="en-US" dirty="0"/>
+              <a:t>create_csv_concatenate.py</a:t>
+            </a:r>
+          </a:p>
+        </p:txBody>
+      </p:sp>
+      <p:cxnSp>
+        <p:nvCxnSpPr>
+          <p:cNvPr id="168" name="Connector: Elbow 167">
+            <a:extLst>
+              <a:ext uri="{FF2B5EF4-FFF2-40B4-BE49-F238E27FC236}">
+                <a16:creationId xmlns:a16="http://schemas.microsoft.com/office/drawing/2014/main" id="{5ED5F28C-D611-6C1C-56AF-920C79ED1C0A}"/>
+              </a:ext>
+            </a:extLst>
+          </p:cNvPr>
+          <p:cNvCxnSpPr>
+            <a:cxnSpLocks/>
+            <a:stCxn id="66" idx="2"/>
+          </p:cNvCxnSpPr>
+          <p:nvPr/>
+        </p:nvCxnSpPr>
+        <p:spPr>
+          <a:xfrm rot="5400000">
+            <a:off x="5220026" y="4279715"/>
+            <a:ext cx="697245" cy="2116547"/>
+          </a:xfrm>
+          <a:prstGeom prst="bentConnector2">
+            <a:avLst/>
+          </a:prstGeom>
+        </p:spPr>
+        <p:style>
+          <a:lnRef idx="2">
+            <a:schemeClr val="dk1"/>
+          </a:lnRef>
+          <a:fillRef idx="0">
+            <a:schemeClr val="dk1"/>
+          </a:fillRef>
+          <a:effectRef idx="1">
+            <a:schemeClr val="dk1"/>
+          </a:effectRef>
+          <a:fontRef idx="minor">
+            <a:schemeClr val="tx1"/>
+          </a:fontRef>
+        </p:style>
+      </p:cxnSp>
+      <p:cxnSp>
+        <p:nvCxnSpPr>
+          <p:cNvPr id="172" name="Connector: Elbow 171">
+            <a:extLst>
+              <a:ext uri="{FF2B5EF4-FFF2-40B4-BE49-F238E27FC236}">
+                <a16:creationId xmlns:a16="http://schemas.microsoft.com/office/drawing/2014/main" id="{82042129-FBCF-10AF-9EEF-012A5CC2BEC1}"/>
+              </a:ext>
+            </a:extLst>
+          </p:cNvPr>
+          <p:cNvCxnSpPr/>
+          <p:nvPr/>
+        </p:nvCxnSpPr>
+        <p:spPr>
+          <a:xfrm rot="5400000">
+            <a:off x="4292068" y="5927917"/>
+            <a:ext cx="450678" cy="12700"/>
+          </a:xfrm>
+          <a:prstGeom prst="bentConnector3">
+            <a:avLst>
+              <a:gd name="adj1" fmla="val -2753"/>
+            </a:avLst>
+          </a:prstGeom>
+          <a:ln>
+            <a:tailEnd type="triangle"/>
+          </a:ln>
+        </p:spPr>
+        <p:style>
+          <a:lnRef idx="2">
+            <a:schemeClr val="dk1"/>
+          </a:lnRef>
+          <a:fillRef idx="0">
+            <a:schemeClr val="dk1"/>
+          </a:fillRef>
+          <a:effectRef idx="1">
+            <a:schemeClr val="dk1"/>
+          </a:effectRef>
+          <a:fontRef idx="minor">
+            <a:schemeClr val="tx1"/>
+          </a:fontRef>
+        </p:style>
+      </p:cxnSp>
+      <p:sp>
+        <p:nvSpPr>
+          <p:cNvPr id="174" name="TextBox 173">
+            <a:extLst>
+              <a:ext uri="{FF2B5EF4-FFF2-40B4-BE49-F238E27FC236}">
+                <a16:creationId xmlns:a16="http://schemas.microsoft.com/office/drawing/2014/main" id="{D7E5D4D9-7524-4267-C3D3-9150F69725EE}"/>
+              </a:ext>
+            </a:extLst>
+          </p:cNvPr>
+          <p:cNvSpPr txBox="1"/>
+          <p:nvPr/>
+        </p:nvSpPr>
+        <p:spPr>
+          <a:xfrm>
+            <a:off x="4981435" y="5637083"/>
+            <a:ext cx="983346" cy="369332"/>
+          </a:xfrm>
+          <a:prstGeom prst="rect">
+            <a:avLst/>
+          </a:prstGeom>
+          <a:noFill/>
+        </p:spPr>
+        <p:txBody>
+          <a:bodyPr wrap="none" rtlCol="0">
+            <a:spAutoFit/>
+          </a:bodyPr>
+          <a:lstStyle/>
+          <a:p>
+            <a:r>
+              <a:rPr lang="en-GB" dirty="0"/>
+              <a:t>csv files</a:t>
+            </a:r>
+            <a:endParaRPr lang="en-US" dirty="0"/>
+          </a:p>
+        </p:txBody>
+      </p:sp>
+      <p:sp>
+        <p:nvSpPr>
+          <p:cNvPr id="175" name="Rectangle: Diagonal Corners Snipped 174">
+            <a:extLst>
+              <a:ext uri="{FF2B5EF4-FFF2-40B4-BE49-F238E27FC236}">
+                <a16:creationId xmlns:a16="http://schemas.microsoft.com/office/drawing/2014/main" id="{56D9C86F-D5BE-85C3-01ED-5FF8197F1382}"/>
+              </a:ext>
+            </a:extLst>
+          </p:cNvPr>
+          <p:cNvSpPr/>
+          <p:nvPr/>
+        </p:nvSpPr>
+        <p:spPr>
+          <a:xfrm>
+            <a:off x="8345128" y="6149619"/>
+            <a:ext cx="1097280" cy="484632"/>
+          </a:xfrm>
+          <a:prstGeom prst="snip2DiagRect">
+            <a:avLst/>
+          </a:prstGeom>
+        </p:spPr>
+        <p:style>
+          <a:lnRef idx="2">
+            <a:schemeClr val="accent6">
+              <a:shade val="15000"/>
+            </a:schemeClr>
+          </a:lnRef>
+          <a:fillRef idx="1">
+            <a:schemeClr val="accent6"/>
+          </a:fillRef>
+          <a:effectRef idx="0">
+            <a:schemeClr val="accent6"/>
+          </a:effectRef>
+          <a:fontRef idx="minor">
+            <a:schemeClr val="lt1"/>
+          </a:fontRef>
+        </p:style>
+        <p:txBody>
+          <a:bodyPr rtlCol="0" anchor="ctr"/>
+          <a:lstStyle/>
+          <a:p>
+            <a:pPr algn="ctr"/>
+            <a:r>
+              <a:rPr lang="en-GB" dirty="0"/>
+              <a:t>Outputs</a:t>
+            </a:r>
+            <a:endParaRPr lang="en-US" dirty="0"/>
+          </a:p>
+        </p:txBody>
+      </p:sp>
+      <p:cxnSp>
+        <p:nvCxnSpPr>
+          <p:cNvPr id="176" name="Connector: Elbow 175">
+            <a:extLst>
+              <a:ext uri="{FF2B5EF4-FFF2-40B4-BE49-F238E27FC236}">
+                <a16:creationId xmlns:a16="http://schemas.microsoft.com/office/drawing/2014/main" id="{538D5A48-080E-A9F8-1CF9-7D9005777B8D}"/>
+              </a:ext>
+            </a:extLst>
+          </p:cNvPr>
+          <p:cNvCxnSpPr>
+            <a:cxnSpLocks/>
+            <a:stCxn id="156" idx="0"/>
+            <a:endCxn id="175" idx="2"/>
+          </p:cNvCxnSpPr>
+          <p:nvPr/>
+        </p:nvCxnSpPr>
+        <p:spPr>
+          <a:xfrm flipV="1">
+            <a:off x="6376922" y="6391935"/>
+            <a:ext cx="1968206" cy="1"/>
+          </a:xfrm>
+          <a:prstGeom prst="bentConnector3">
+            <a:avLst/>
+          </a:prstGeom>
+          <a:ln>
+            <a:tailEnd type="triangle"/>
+          </a:ln>
+        </p:spPr>
+        <p:style>
+          <a:lnRef idx="2">
+            <a:schemeClr val="dk1"/>
+          </a:lnRef>
+          <a:fillRef idx="0">
+            <a:schemeClr val="dk1"/>
+          </a:fillRef>
+          <a:effectRef idx="1">
+            <a:schemeClr val="dk1"/>
+          </a:effectRef>
+          <a:fontRef idx="minor">
+            <a:schemeClr val="tx1"/>
+          </a:fontRef>
+        </p:style>
+      </p:cxnSp>
+      <p:sp>
+        <p:nvSpPr>
+          <p:cNvPr id="177" name="TextBox 176">
+            <a:extLst>
+              <a:ext uri="{FF2B5EF4-FFF2-40B4-BE49-F238E27FC236}">
+                <a16:creationId xmlns:a16="http://schemas.microsoft.com/office/drawing/2014/main" id="{0568B739-DDE7-24E7-D838-8F343D7809E0}"/>
+              </a:ext>
+            </a:extLst>
+          </p:cNvPr>
+          <p:cNvSpPr txBox="1"/>
+          <p:nvPr/>
+        </p:nvSpPr>
+        <p:spPr>
+          <a:xfrm>
+            <a:off x="7377252" y="6329827"/>
+            <a:ext cx="917337" cy="369332"/>
+          </a:xfrm>
+          <a:prstGeom prst="rect">
+            <a:avLst/>
+          </a:prstGeom>
+          <a:noFill/>
+        </p:spPr>
+        <p:txBody>
+          <a:bodyPr wrap="square" rtlCol="0">
+            <a:spAutoFit/>
+          </a:bodyPr>
+          <a:lstStyle/>
+          <a:p>
+            <a:r>
+              <a:rPr lang="en-GB" dirty="0"/>
+              <a:t>csv file</a:t>
+            </a:r>
+            <a:endParaRPr lang="en-US" dirty="0"/>
+          </a:p>
+        </p:txBody>
+      </p:sp>
+      <p:sp>
+        <p:nvSpPr>
+          <p:cNvPr id="180" name="Rectangle: Single Corner Snipped 179">
+            <a:extLst>
+              <a:ext uri="{FF2B5EF4-FFF2-40B4-BE49-F238E27FC236}">
+                <a16:creationId xmlns:a16="http://schemas.microsoft.com/office/drawing/2014/main" id="{28D08BF1-A0F1-B7C2-C3F3-EEBBC5F75157}"/>
+              </a:ext>
+            </a:extLst>
+          </p:cNvPr>
+          <p:cNvSpPr/>
+          <p:nvPr/>
+        </p:nvSpPr>
+        <p:spPr>
+          <a:xfrm>
+            <a:off x="9774936" y="5180574"/>
+            <a:ext cx="2325624" cy="554002"/>
+          </a:xfrm>
+          <a:prstGeom prst="snip1Rect">
+            <a:avLst/>
+          </a:prstGeom>
+          <a:solidFill>
+            <a:srgbClr val="FFFF00"/>
+          </a:solidFill>
+        </p:spPr>
+        <p:style>
+          <a:lnRef idx="2">
+            <a:schemeClr val="accent1">
+              <a:shade val="15000"/>
+            </a:schemeClr>
+          </a:lnRef>
+          <a:fillRef idx="1">
+            <a:schemeClr val="accent1"/>
+          </a:fillRef>
+          <a:effectRef idx="0">
+            <a:schemeClr val="accent1"/>
+          </a:effectRef>
+          <a:fontRef idx="minor">
+            <a:schemeClr val="lt1"/>
+          </a:fontRef>
+        </p:style>
+        <p:txBody>
+          <a:bodyPr rtlCol="0" anchor="ctr"/>
+          <a:lstStyle/>
+          <a:p>
+            <a:pPr algn="ctr"/>
+            <a:r>
+              <a:rPr lang="en-US" dirty="0">
+                <a:ln w="0"/>
+                <a:solidFill>
+                  <a:schemeClr val="tx1"/>
+                </a:solidFill>
+                <a:effectLst>
+                  <a:outerShdw blurRad="38100" dist="19050" dir="2700000" algn="tl" rotWithShape="0">
+                    <a:schemeClr val="dk1">
+                      <a:alpha val="40000"/>
+                    </a:schemeClr>
+                  </a:outerShdw>
+                </a:effectLst>
+              </a:rPr>
+              <a:t>compare_outputs.py</a:t>
+            </a:r>
+          </a:p>
+        </p:txBody>
+      </p:sp>
+      <p:cxnSp>
+        <p:nvCxnSpPr>
+          <p:cNvPr id="184" name="Connector: Elbow 183">
+            <a:extLst>
+              <a:ext uri="{FF2B5EF4-FFF2-40B4-BE49-F238E27FC236}">
+                <a16:creationId xmlns:a16="http://schemas.microsoft.com/office/drawing/2014/main" id="{7EBF53E7-21C4-87B9-F3B7-8416FA0E9E68}"/>
+              </a:ext>
+            </a:extLst>
+          </p:cNvPr>
+          <p:cNvCxnSpPr>
+            <a:cxnSpLocks/>
+            <a:stCxn id="175" idx="0"/>
+            <a:endCxn id="180" idx="1"/>
+          </p:cNvCxnSpPr>
+          <p:nvPr/>
+        </p:nvCxnSpPr>
+        <p:spPr>
+          <a:xfrm flipV="1">
+            <a:off x="9442408" y="5734576"/>
+            <a:ext cx="1495340" cy="657359"/>
+          </a:xfrm>
+          <a:prstGeom prst="bentConnector2">
+            <a:avLst/>
+          </a:prstGeom>
+          <a:ln w="19050" cap="flat" cmpd="sng" algn="ctr">
+            <a:solidFill>
+              <a:schemeClr val="dk1"/>
+            </a:solidFill>
+            <a:prstDash val="dash"/>
+            <a:round/>
+            <a:headEnd type="none" w="med" len="med"/>
+            <a:tailEnd type="none" w="med" len="med"/>
+          </a:ln>
+        </p:spPr>
+        <p:style>
+          <a:lnRef idx="0">
+            <a:scrgbClr r="0" g="0" b="0"/>
+          </a:lnRef>
+          <a:fillRef idx="0">
+            <a:scrgbClr r="0" g="0" b="0"/>
+          </a:fillRef>
+          <a:effectRef idx="0">
+            <a:scrgbClr r="0" g="0" b="0"/>
+          </a:effectRef>
+          <a:fontRef idx="minor">
+            <a:schemeClr val="tx1"/>
+          </a:fontRef>
+        </p:style>
+      </p:cxnSp>
+      <p:cxnSp>
+        <p:nvCxnSpPr>
+          <p:cNvPr id="187" name="Connector: Elbow 186">
+            <a:extLst>
+              <a:ext uri="{FF2B5EF4-FFF2-40B4-BE49-F238E27FC236}">
+                <a16:creationId xmlns:a16="http://schemas.microsoft.com/office/drawing/2014/main" id="{7EF6F3A5-5ECC-823A-452B-765F8EB9CC07}"/>
+              </a:ext>
+            </a:extLst>
+          </p:cNvPr>
+          <p:cNvCxnSpPr>
+            <a:cxnSpLocks/>
+            <a:stCxn id="146" idx="0"/>
+            <a:endCxn id="180" idx="3"/>
+          </p:cNvCxnSpPr>
+          <p:nvPr/>
+        </p:nvCxnSpPr>
+        <p:spPr>
+          <a:xfrm>
+            <a:off x="10493402" y="692850"/>
+            <a:ext cx="444346" cy="4487724"/>
+          </a:xfrm>
+          <a:prstGeom prst="bentConnector2">
+            <a:avLst/>
+          </a:prstGeom>
+          <a:ln w="19050" cap="flat" cmpd="sng" algn="ctr">
+            <a:solidFill>
+              <a:schemeClr val="dk1"/>
+            </a:solidFill>
+            <a:prstDash val="dash"/>
+            <a:round/>
+            <a:headEnd type="none" w="med" len="med"/>
+            <a:tailEnd type="none" w="med" len="med"/>
+          </a:ln>
+        </p:spPr>
+        <p:style>
+          <a:lnRef idx="0">
+            <a:scrgbClr r="0" g="0" b="0"/>
+          </a:lnRef>
+          <a:fillRef idx="0">
+            <a:scrgbClr r="0" g="0" b="0"/>
+          </a:fillRef>
+          <a:effectRef idx="0">
+            <a:scrgbClr r="0" g="0" b="0"/>
+          </a:effectRef>
+          <a:fontRef idx="minor">
+            <a:schemeClr val="tx1"/>
+          </a:fontRef>
+        </p:style>
+      </p:cxnSp>
+      <p:sp>
+        <p:nvSpPr>
+          <p:cNvPr id="190" name="Hexagon 189">
+            <a:extLst>
+              <a:ext uri="{FF2B5EF4-FFF2-40B4-BE49-F238E27FC236}">
+                <a16:creationId xmlns:a16="http://schemas.microsoft.com/office/drawing/2014/main" id="{BEC7378F-8B5D-1ACE-6FBC-5368E31CDDE0}"/>
+              </a:ext>
+            </a:extLst>
+          </p:cNvPr>
+          <p:cNvSpPr/>
+          <p:nvPr/>
+        </p:nvSpPr>
+        <p:spPr>
+          <a:xfrm>
+            <a:off x="329404" y="3177397"/>
+            <a:ext cx="1994127" cy="484632"/>
+          </a:xfrm>
+          <a:prstGeom prst="hexagon">
+            <a:avLst/>
+          </a:prstGeom>
+          <a:solidFill>
+            <a:srgbClr val="FF0000"/>
+          </a:solidFill>
+        </p:spPr>
+        <p:style>
+          <a:lnRef idx="2">
+            <a:schemeClr val="accent1">
+              <a:shade val="15000"/>
+            </a:schemeClr>
+          </a:lnRef>
+          <a:fillRef idx="1">
+            <a:schemeClr val="accent1"/>
+          </a:fillRef>
+          <a:effectRef idx="0">
+            <a:schemeClr val="accent1"/>
+          </a:effectRef>
+          <a:fontRef idx="minor">
+            <a:schemeClr val="lt1"/>
+          </a:fontRef>
+        </p:style>
+        <p:txBody>
+          <a:bodyPr rtlCol="0" anchor="ctr"/>
+          <a:lstStyle/>
+          <a:p>
+            <a:pPr algn="ctr"/>
+            <a:r>
+              <a:rPr lang="en-GB" dirty="0"/>
+              <a:t>test_inputs.py</a:t>
+            </a:r>
+            <a:endParaRPr lang="en-US" dirty="0"/>
+          </a:p>
+        </p:txBody>
+      </p:sp>
+      <p:sp>
+        <p:nvSpPr>
+          <p:cNvPr id="191" name="Right Brace 190">
+            <a:extLst>
+              <a:ext uri="{FF2B5EF4-FFF2-40B4-BE49-F238E27FC236}">
+                <a16:creationId xmlns:a16="http://schemas.microsoft.com/office/drawing/2014/main" id="{DE2E354E-D677-1B48-33D0-654EC5CA8E76}"/>
+              </a:ext>
+            </a:extLst>
+          </p:cNvPr>
+          <p:cNvSpPr/>
+          <p:nvPr/>
+        </p:nvSpPr>
+        <p:spPr>
+          <a:xfrm rot="16200000">
+            <a:off x="2454233" y="3740987"/>
+            <a:ext cx="185904" cy="695502"/>
+          </a:xfrm>
+          <a:prstGeom prst="rightBrace">
+            <a:avLst/>
+          </a:prstGeom>
+          <a:ln>
+            <a:headEnd type="none" w="med" len="med"/>
+            <a:tailEnd type="none" w="med" len="med"/>
+          </a:ln>
+        </p:spPr>
+        <p:style>
+          <a:lnRef idx="2">
+            <a:schemeClr val="dk1"/>
+          </a:lnRef>
+          <a:fillRef idx="0">
+            <a:schemeClr val="dk1"/>
+          </a:fillRef>
+          <a:effectRef idx="1">
+            <a:schemeClr val="dk1"/>
+          </a:effectRef>
+          <a:fontRef idx="minor">
+            <a:schemeClr val="tx1"/>
+          </a:fontRef>
+        </p:style>
+        <p:txBody>
+          <a:bodyPr rtlCol="0" anchor="ctr"/>
+          <a:lstStyle/>
+          <a:p>
+            <a:pPr algn="ctr"/>
+            <a:endParaRPr lang="en-US"/>
+          </a:p>
+        </p:txBody>
+      </p:sp>
+      <p:cxnSp>
+        <p:nvCxnSpPr>
+          <p:cNvPr id="193" name="Connector: Elbow 192">
+            <a:extLst>
+              <a:ext uri="{FF2B5EF4-FFF2-40B4-BE49-F238E27FC236}">
+                <a16:creationId xmlns:a16="http://schemas.microsoft.com/office/drawing/2014/main" id="{B7380B02-6C8F-EBC3-6B38-6F717BFBEE40}"/>
+              </a:ext>
+            </a:extLst>
+          </p:cNvPr>
+          <p:cNvCxnSpPr>
+            <a:stCxn id="191" idx="1"/>
+          </p:cNvCxnSpPr>
+          <p:nvPr/>
+        </p:nvCxnSpPr>
+        <p:spPr>
+          <a:xfrm rot="5400000" flipH="1">
+            <a:off x="1738828" y="3187429"/>
+            <a:ext cx="333758" cy="1282957"/>
+          </a:xfrm>
+          <a:prstGeom prst="bentConnector3">
+            <a:avLst>
+              <a:gd name="adj1" fmla="val 40559"/>
+            </a:avLst>
+          </a:prstGeom>
+          <a:ln>
+            <a:headEnd type="none" w="med" len="med"/>
+            <a:tailEnd type="none" w="med" len="med"/>
+          </a:ln>
+        </p:spPr>
+        <p:style>
+          <a:lnRef idx="2">
+            <a:schemeClr val="dk1"/>
+          </a:lnRef>
+          <a:fillRef idx="0">
+            <a:schemeClr val="dk1"/>
+          </a:fillRef>
+          <a:effectRef idx="1">
+            <a:schemeClr val="dk1"/>
+          </a:effectRef>
+          <a:fontRef idx="minor">
+            <a:schemeClr val="tx1"/>
+          </a:fontRef>
+        </p:style>
+      </p:cxnSp>
+      <p:sp>
+        <p:nvSpPr>
+          <p:cNvPr id="205" name="Right Brace 204">
+            <a:extLst>
+              <a:ext uri="{FF2B5EF4-FFF2-40B4-BE49-F238E27FC236}">
+                <a16:creationId xmlns:a16="http://schemas.microsoft.com/office/drawing/2014/main" id="{26636FA5-29AA-7698-18C7-EE01070F0E99}"/>
+              </a:ext>
+            </a:extLst>
+          </p:cNvPr>
+          <p:cNvSpPr/>
+          <p:nvPr/>
+        </p:nvSpPr>
+        <p:spPr>
+          <a:xfrm rot="5400000">
+            <a:off x="5539982" y="4725478"/>
+            <a:ext cx="185904" cy="695502"/>
+          </a:xfrm>
+          <a:prstGeom prst="rightBrace">
+            <a:avLst/>
+          </a:prstGeom>
+          <a:ln>
+            <a:headEnd type="none" w="med" len="med"/>
+            <a:tailEnd type="none" w="med" len="med"/>
+          </a:ln>
+        </p:spPr>
+        <p:style>
+          <a:lnRef idx="2">
+            <a:schemeClr val="dk1"/>
+          </a:lnRef>
+          <a:fillRef idx="0">
+            <a:schemeClr val="dk1"/>
+          </a:fillRef>
+          <a:effectRef idx="1">
+            <a:schemeClr val="dk1"/>
+          </a:effectRef>
+          <a:fontRef idx="minor">
+            <a:schemeClr val="tx1"/>
+          </a:fontRef>
+        </p:style>
+        <p:txBody>
+          <a:bodyPr rtlCol="0" anchor="ctr"/>
+          <a:lstStyle/>
+          <a:p>
+            <a:pPr algn="ctr"/>
+            <a:endParaRPr lang="en-US"/>
+          </a:p>
+        </p:txBody>
+      </p:sp>
+      <p:cxnSp>
+        <p:nvCxnSpPr>
+          <p:cNvPr id="207" name="Connector: Elbow 206">
+            <a:extLst>
+              <a:ext uri="{FF2B5EF4-FFF2-40B4-BE49-F238E27FC236}">
+                <a16:creationId xmlns:a16="http://schemas.microsoft.com/office/drawing/2014/main" id="{343F327C-D657-E8D8-2B08-AC9C51EA3241}"/>
+              </a:ext>
+            </a:extLst>
+          </p:cNvPr>
+          <p:cNvCxnSpPr>
+            <a:stCxn id="205" idx="1"/>
+            <a:endCxn id="156" idx="3"/>
+          </p:cNvCxnSpPr>
+          <p:nvPr/>
+        </p:nvCxnSpPr>
+        <p:spPr>
+          <a:xfrm rot="16200000" flipH="1" flipV="1">
+            <a:off x="3594310" y="4353311"/>
+            <a:ext cx="1225755" cy="2851493"/>
+          </a:xfrm>
+          <a:prstGeom prst="bentConnector4">
+            <a:avLst>
+              <a:gd name="adj1" fmla="val 30440"/>
+              <a:gd name="adj2" fmla="val 105452"/>
+            </a:avLst>
+          </a:prstGeom>
+          <a:ln>
+            <a:tailEnd type="triangle"/>
+          </a:ln>
+        </p:spPr>
+        <p:style>
+          <a:lnRef idx="2">
+            <a:schemeClr val="dk1"/>
+          </a:lnRef>
+          <a:fillRef idx="0">
+            <a:schemeClr val="dk1"/>
+          </a:fillRef>
+          <a:effectRef idx="1">
+            <a:schemeClr val="dk1"/>
+          </a:effectRef>
+          <a:fontRef idx="minor">
+            <a:schemeClr val="tx1"/>
+          </a:fontRef>
+        </p:style>
+      </p:cxnSp>
+      <p:sp>
+        <p:nvSpPr>
+          <p:cNvPr id="214" name="Rectangle: Diagonal Corners Snipped 213">
+            <a:extLst>
+              <a:ext uri="{FF2B5EF4-FFF2-40B4-BE49-F238E27FC236}">
+                <a16:creationId xmlns:a16="http://schemas.microsoft.com/office/drawing/2014/main" id="{AB26C1A6-1247-95B3-11FE-729841807A3C}"/>
+              </a:ext>
+            </a:extLst>
+          </p:cNvPr>
+          <p:cNvSpPr/>
+          <p:nvPr/>
+        </p:nvSpPr>
+        <p:spPr>
+          <a:xfrm>
+            <a:off x="7779569" y="4393481"/>
+            <a:ext cx="2820741" cy="484632"/>
+          </a:xfrm>
+          <a:prstGeom prst="snip2DiagRect">
+            <a:avLst/>
+          </a:prstGeom>
+        </p:spPr>
+        <p:style>
+          <a:lnRef idx="2">
+            <a:schemeClr val="accent6">
+              <a:shade val="15000"/>
+            </a:schemeClr>
+          </a:lnRef>
+          <a:fillRef idx="1">
+            <a:schemeClr val="accent6"/>
+          </a:fillRef>
+          <a:effectRef idx="0">
+            <a:schemeClr val="accent6"/>
+          </a:effectRef>
+          <a:fontRef idx="minor">
+            <a:schemeClr val="lt1"/>
+          </a:fontRef>
+        </p:style>
+        <p:txBody>
+          <a:bodyPr rtlCol="0" anchor="ctr"/>
+          <a:lstStyle/>
+          <a:p>
+            <a:pPr algn="ctr"/>
+            <a:r>
+              <a:rPr lang="en-GB" dirty="0" err="1"/>
+              <a:t>status_of_each_future</a:t>
+            </a:r>
+            <a:endParaRPr lang="en-US" dirty="0"/>
+          </a:p>
+        </p:txBody>
+      </p:sp>
+      <p:sp>
+        <p:nvSpPr>
+          <p:cNvPr id="220" name="TextBox 219">
+            <a:extLst>
+              <a:ext uri="{FF2B5EF4-FFF2-40B4-BE49-F238E27FC236}">
+                <a16:creationId xmlns:a16="http://schemas.microsoft.com/office/drawing/2014/main" id="{CFFB429F-2D4D-B81F-A5AC-3A0793331F74}"/>
+              </a:ext>
+            </a:extLst>
+          </p:cNvPr>
+          <p:cNvSpPr txBox="1"/>
+          <p:nvPr/>
+        </p:nvSpPr>
+        <p:spPr>
+          <a:xfrm>
+            <a:off x="3570658" y="4519329"/>
+            <a:ext cx="728084" cy="369332"/>
+          </a:xfrm>
+          <a:prstGeom prst="rect">
+            <a:avLst/>
+          </a:prstGeom>
+          <a:noFill/>
+        </p:spPr>
+        <p:txBody>
+          <a:bodyPr wrap="none" rtlCol="0">
+            <a:spAutoFit/>
+          </a:bodyPr>
+          <a:lstStyle/>
+          <a:p>
+            <a:r>
+              <a:rPr lang="en-GB" dirty="0">
+                <a:solidFill>
+                  <a:schemeClr val="bg1"/>
+                </a:solidFill>
+              </a:rPr>
+              <a:t>GLPK</a:t>
+            </a:r>
+            <a:endParaRPr lang="en-US" dirty="0">
+              <a:solidFill>
+                <a:schemeClr val="bg1"/>
+              </a:solidFill>
+            </a:endParaRPr>
+          </a:p>
+        </p:txBody>
+      </p:sp>
+      <p:sp>
+        <p:nvSpPr>
+          <p:cNvPr id="225" name="Right Brace 224">
+            <a:extLst>
+              <a:ext uri="{FF2B5EF4-FFF2-40B4-BE49-F238E27FC236}">
+                <a16:creationId xmlns:a16="http://schemas.microsoft.com/office/drawing/2014/main" id="{7FE550F0-4082-2112-ED15-3CF7F6BB2705}"/>
+              </a:ext>
+            </a:extLst>
+          </p:cNvPr>
+          <p:cNvSpPr/>
+          <p:nvPr/>
+        </p:nvSpPr>
+        <p:spPr>
+          <a:xfrm rot="10800000">
+            <a:off x="4253668" y="4322034"/>
+            <a:ext cx="256706" cy="777239"/>
+          </a:xfrm>
+          <a:prstGeom prst="rightBrace">
+            <a:avLst/>
+          </a:prstGeom>
+        </p:spPr>
+        <p:style>
+          <a:lnRef idx="2">
+            <a:schemeClr val="dk1"/>
+          </a:lnRef>
+          <a:fillRef idx="0">
+            <a:schemeClr val="dk1"/>
+          </a:fillRef>
+          <a:effectRef idx="1">
+            <a:schemeClr val="dk1"/>
+          </a:effectRef>
+          <a:fontRef idx="minor">
+            <a:schemeClr val="tx1"/>
+          </a:fontRef>
+        </p:style>
+        <p:txBody>
+          <a:bodyPr rtlCol="0" anchor="ctr"/>
+          <a:lstStyle/>
+          <a:p>
+            <a:pPr algn="ctr"/>
+            <a:endParaRPr lang="en-US"/>
+          </a:p>
+        </p:txBody>
+      </p:sp>
+      <p:cxnSp>
+        <p:nvCxnSpPr>
+          <p:cNvPr id="238" name="Connector: Elbow 237">
+            <a:extLst>
+              <a:ext uri="{FF2B5EF4-FFF2-40B4-BE49-F238E27FC236}">
+                <a16:creationId xmlns:a16="http://schemas.microsoft.com/office/drawing/2014/main" id="{790FD0E4-5DDE-9B11-1DEC-0F0D5DC42267}"/>
+              </a:ext>
+            </a:extLst>
+          </p:cNvPr>
+          <p:cNvCxnSpPr>
+            <a:stCxn id="56" idx="1"/>
+          </p:cNvCxnSpPr>
+          <p:nvPr/>
+        </p:nvCxnSpPr>
+        <p:spPr>
+          <a:xfrm rot="10800000" flipH="1">
+            <a:off x="3011965" y="4162822"/>
+            <a:ext cx="1483763" cy="258418"/>
+          </a:xfrm>
+          <a:prstGeom prst="bentConnector3">
+            <a:avLst>
+              <a:gd name="adj1" fmla="val 21570"/>
+            </a:avLst>
+          </a:prstGeom>
+          <a:ln>
+            <a:tailEnd type="triangle"/>
+          </a:ln>
+        </p:spPr>
+        <p:style>
+          <a:lnRef idx="2">
+            <a:schemeClr val="dk1"/>
+          </a:lnRef>
+          <a:fillRef idx="0">
+            <a:schemeClr val="dk1"/>
+          </a:fillRef>
+          <a:effectRef idx="1">
+            <a:schemeClr val="dk1"/>
+          </a:effectRef>
+          <a:fontRef idx="minor">
+            <a:schemeClr val="tx1"/>
+          </a:fontRef>
+        </p:style>
+      </p:cxnSp>
+      <p:cxnSp>
+        <p:nvCxnSpPr>
+          <p:cNvPr id="241" name="Connector: Elbow 240">
+            <a:extLst>
+              <a:ext uri="{FF2B5EF4-FFF2-40B4-BE49-F238E27FC236}">
+                <a16:creationId xmlns:a16="http://schemas.microsoft.com/office/drawing/2014/main" id="{625F0034-07E6-DD0F-FB53-F74BF8362955}"/>
+              </a:ext>
+            </a:extLst>
+          </p:cNvPr>
+          <p:cNvCxnSpPr>
+            <a:cxnSpLocks/>
+            <a:endCxn id="220" idx="1"/>
+          </p:cNvCxnSpPr>
+          <p:nvPr/>
+        </p:nvCxnSpPr>
+        <p:spPr>
+          <a:xfrm rot="16200000" flipH="1">
+            <a:off x="3310444" y="4443781"/>
+            <a:ext cx="282756" cy="237672"/>
+          </a:xfrm>
+          <a:prstGeom prst="bentConnector2">
+            <a:avLst/>
+          </a:prstGeom>
+          <a:ln>
+            <a:tailEnd type="triangle"/>
+          </a:ln>
+        </p:spPr>
+        <p:style>
+          <a:lnRef idx="2">
+            <a:schemeClr val="dk1"/>
+          </a:lnRef>
+          <a:fillRef idx="0">
+            <a:schemeClr val="dk1"/>
+          </a:fillRef>
+          <a:effectRef idx="1">
+            <a:schemeClr val="dk1"/>
+          </a:effectRef>
+          <a:fontRef idx="minor">
+            <a:schemeClr val="tx1"/>
+          </a:fontRef>
+        </p:style>
+      </p:cxnSp>
+      <p:cxnSp>
+        <p:nvCxnSpPr>
+          <p:cNvPr id="255" name="Straight Arrow Connector 254">
+            <a:extLst>
+              <a:ext uri="{FF2B5EF4-FFF2-40B4-BE49-F238E27FC236}">
+                <a16:creationId xmlns:a16="http://schemas.microsoft.com/office/drawing/2014/main" id="{8F1DD02D-70BB-07A7-B198-C1BF63559DB6}"/>
+              </a:ext>
+            </a:extLst>
+          </p:cNvPr>
+          <p:cNvCxnSpPr>
+            <a:stCxn id="64" idx="1"/>
+            <a:endCxn id="66" idx="1"/>
+          </p:cNvCxnSpPr>
+          <p:nvPr/>
+        </p:nvCxnSpPr>
+        <p:spPr>
+          <a:xfrm flipV="1">
+            <a:off x="5342534" y="4710474"/>
+            <a:ext cx="738364" cy="4387"/>
+          </a:xfrm>
+          <a:prstGeom prst="straightConnector1">
+            <a:avLst/>
+          </a:prstGeom>
+          <a:ln>
+            <a:tailEnd type="triangle"/>
+          </a:ln>
+        </p:spPr>
+        <p:style>
+          <a:lnRef idx="2">
+            <a:schemeClr val="dk1"/>
+          </a:lnRef>
+          <a:fillRef idx="0">
+            <a:schemeClr val="dk1"/>
+          </a:fillRef>
+          <a:effectRef idx="1">
+            <a:schemeClr val="dk1"/>
+          </a:effectRef>
+          <a:fontRef idx="minor">
+            <a:schemeClr val="tx1"/>
+          </a:fontRef>
+        </p:style>
+      </p:cxnSp>
+      <p:sp>
+        <p:nvSpPr>
+          <p:cNvPr id="264" name="Rectangle: Diagonal Corners Snipped 263">
+            <a:extLst>
+              <a:ext uri="{FF2B5EF4-FFF2-40B4-BE49-F238E27FC236}">
+                <a16:creationId xmlns:a16="http://schemas.microsoft.com/office/drawing/2014/main" id="{ECC968FF-6611-9D8C-53DB-884251BF8866}"/>
+              </a:ext>
+            </a:extLst>
+          </p:cNvPr>
+          <p:cNvSpPr/>
+          <p:nvPr/>
+        </p:nvSpPr>
+        <p:spPr>
+          <a:xfrm>
+            <a:off x="3526366" y="2438378"/>
+            <a:ext cx="2031665" cy="484632"/>
+          </a:xfrm>
+          <a:prstGeom prst="snip2DiagRect">
+            <a:avLst/>
+          </a:prstGeom>
+        </p:spPr>
+        <p:style>
+          <a:lnRef idx="2">
+            <a:schemeClr val="accent6">
+              <a:shade val="15000"/>
+            </a:schemeClr>
+          </a:lnRef>
+          <a:fillRef idx="1">
+            <a:schemeClr val="accent6"/>
+          </a:fillRef>
+          <a:effectRef idx="0">
+            <a:schemeClr val="accent6"/>
+          </a:effectRef>
+          <a:fontRef idx="minor">
+            <a:schemeClr val="lt1"/>
+          </a:fontRef>
+        </p:style>
+        <p:txBody>
+          <a:bodyPr rtlCol="0" anchor="ctr"/>
+          <a:lstStyle/>
+          <a:p>
+            <a:pPr algn="ctr"/>
+            <a:r>
+              <a:rPr lang="en-GB" dirty="0" err="1"/>
+              <a:t>tests_results</a:t>
+            </a:r>
+            <a:endParaRPr lang="en-US" dirty="0"/>
+          </a:p>
+        </p:txBody>
+      </p:sp>
+      <p:cxnSp>
+        <p:nvCxnSpPr>
+          <p:cNvPr id="268" name="Connector: Elbow 267">
+            <a:extLst>
+              <a:ext uri="{FF2B5EF4-FFF2-40B4-BE49-F238E27FC236}">
+                <a16:creationId xmlns:a16="http://schemas.microsoft.com/office/drawing/2014/main" id="{5C3BC6DA-8031-7BB4-857D-50D318B1CD30}"/>
+              </a:ext>
+            </a:extLst>
+          </p:cNvPr>
+          <p:cNvCxnSpPr>
+            <a:stCxn id="4" idx="3"/>
+            <a:endCxn id="75" idx="1"/>
+          </p:cNvCxnSpPr>
+          <p:nvPr/>
+        </p:nvCxnSpPr>
+        <p:spPr>
+          <a:xfrm flipV="1">
+            <a:off x="2134634" y="1325880"/>
+            <a:ext cx="1336703" cy="1233441"/>
+          </a:xfrm>
+          <a:prstGeom prst="bentConnector3">
+            <a:avLst/>
+          </a:prstGeom>
+          <a:ln>
+            <a:tailEnd type="triangle"/>
+          </a:ln>
+        </p:spPr>
+        <p:style>
+          <a:lnRef idx="2">
+            <a:schemeClr val="dk1"/>
+          </a:lnRef>
+          <a:fillRef idx="0">
+            <a:schemeClr val="dk1"/>
+          </a:fillRef>
+          <a:effectRef idx="1">
+            <a:schemeClr val="dk1"/>
+          </a:effectRef>
+          <a:fontRef idx="minor">
+            <a:schemeClr val="tx1"/>
+          </a:fontRef>
+        </p:style>
+      </p:cxnSp>
+      <p:cxnSp>
+        <p:nvCxnSpPr>
+          <p:cNvPr id="270" name="Connector: Elbow 269">
+            <a:extLst>
+              <a:ext uri="{FF2B5EF4-FFF2-40B4-BE49-F238E27FC236}">
+                <a16:creationId xmlns:a16="http://schemas.microsoft.com/office/drawing/2014/main" id="{7BDCA45F-2F22-2E65-39B7-755162B37876}"/>
+              </a:ext>
+            </a:extLst>
+          </p:cNvPr>
+          <p:cNvCxnSpPr>
+            <a:cxnSpLocks/>
+          </p:cNvCxnSpPr>
+          <p:nvPr/>
+        </p:nvCxnSpPr>
+        <p:spPr>
+          <a:xfrm flipV="1">
+            <a:off x="2323531" y="2652324"/>
+            <a:ext cx="1240373" cy="757352"/>
+          </a:xfrm>
+          <a:prstGeom prst="bentConnector3">
+            <a:avLst>
+              <a:gd name="adj1" fmla="val 62532"/>
+            </a:avLst>
+          </a:prstGeom>
+          <a:ln>
+            <a:tailEnd type="triangle"/>
+          </a:ln>
+        </p:spPr>
+        <p:style>
+          <a:lnRef idx="2">
+            <a:schemeClr val="dk1"/>
+          </a:lnRef>
+          <a:fillRef idx="0">
+            <a:schemeClr val="dk1"/>
+          </a:fillRef>
+          <a:effectRef idx="1">
+            <a:schemeClr val="dk1"/>
+          </a:effectRef>
+          <a:fontRef idx="minor">
+            <a:schemeClr val="tx1"/>
+          </a:fontRef>
+        </p:style>
+      </p:cxnSp>
+      <p:sp>
+        <p:nvSpPr>
+          <p:cNvPr id="272" name="TextBox 271">
+            <a:extLst>
+              <a:ext uri="{FF2B5EF4-FFF2-40B4-BE49-F238E27FC236}">
+                <a16:creationId xmlns:a16="http://schemas.microsoft.com/office/drawing/2014/main" id="{18F73876-46C7-B17A-BDCF-F0F940062BE9}"/>
+              </a:ext>
+            </a:extLst>
+          </p:cNvPr>
+          <p:cNvSpPr txBox="1"/>
+          <p:nvPr/>
+        </p:nvSpPr>
+        <p:spPr>
+          <a:xfrm>
+            <a:off x="2310232" y="3054585"/>
+            <a:ext cx="788999" cy="369332"/>
+          </a:xfrm>
+          <a:prstGeom prst="rect">
+            <a:avLst/>
+          </a:prstGeom>
+          <a:noFill/>
+        </p:spPr>
+        <p:txBody>
+          <a:bodyPr wrap="none" rtlCol="0">
+            <a:spAutoFit/>
+          </a:bodyPr>
+          <a:lstStyle/>
+          <a:p>
+            <a:r>
+              <a:rPr lang="en-GB" dirty="0"/>
+              <a:t>txt file</a:t>
+            </a:r>
+            <a:endParaRPr lang="en-US" dirty="0"/>
+          </a:p>
+        </p:txBody>
+      </p:sp>
+      <p:cxnSp>
+        <p:nvCxnSpPr>
+          <p:cNvPr id="292" name="Connector: Elbow 291">
+            <a:extLst>
+              <a:ext uri="{FF2B5EF4-FFF2-40B4-BE49-F238E27FC236}">
+                <a16:creationId xmlns:a16="http://schemas.microsoft.com/office/drawing/2014/main" id="{043427AD-D881-D1F8-0D2D-2E7C48124D0C}"/>
+              </a:ext>
+            </a:extLst>
+          </p:cNvPr>
+          <p:cNvCxnSpPr>
+            <a:stCxn id="156" idx="0"/>
+            <a:endCxn id="214" idx="2"/>
+          </p:cNvCxnSpPr>
+          <p:nvPr/>
+        </p:nvCxnSpPr>
+        <p:spPr>
+          <a:xfrm flipV="1">
+            <a:off x="6376922" y="4635797"/>
+            <a:ext cx="1402647" cy="1756139"/>
+          </a:xfrm>
+          <a:prstGeom prst="bentConnector3">
+            <a:avLst>
+              <a:gd name="adj1" fmla="val 71513"/>
+            </a:avLst>
+          </a:prstGeom>
+          <a:ln>
+            <a:tailEnd type="triangle"/>
+          </a:ln>
+        </p:spPr>
+        <p:style>
+          <a:lnRef idx="2">
+            <a:schemeClr val="dk1"/>
+          </a:lnRef>
+          <a:fillRef idx="0">
+            <a:schemeClr val="dk1"/>
+          </a:fillRef>
+          <a:effectRef idx="1">
+            <a:schemeClr val="dk1"/>
+          </a:effectRef>
+          <a:fontRef idx="minor">
+            <a:schemeClr val="tx1"/>
+          </a:fontRef>
+        </p:style>
+      </p:cxnSp>
+      <p:sp>
+        <p:nvSpPr>
+          <p:cNvPr id="296" name="TextBox 295">
+            <a:extLst>
+              <a:ext uri="{FF2B5EF4-FFF2-40B4-BE49-F238E27FC236}">
+                <a16:creationId xmlns:a16="http://schemas.microsoft.com/office/drawing/2014/main" id="{559988C2-07D5-9A7C-619C-DA67BE816F8A}"/>
+              </a:ext>
+            </a:extLst>
+          </p:cNvPr>
+          <p:cNvSpPr txBox="1"/>
+          <p:nvPr/>
+        </p:nvSpPr>
+        <p:spPr>
+          <a:xfrm>
+            <a:off x="7351024" y="5183910"/>
+            <a:ext cx="788999" cy="369332"/>
+          </a:xfrm>
+          <a:prstGeom prst="rect">
+            <a:avLst/>
+          </a:prstGeom>
+          <a:noFill/>
+        </p:spPr>
+        <p:txBody>
+          <a:bodyPr wrap="none" rtlCol="0">
+            <a:spAutoFit/>
+          </a:bodyPr>
+          <a:lstStyle/>
+          <a:p>
+            <a:r>
+              <a:rPr lang="en-GB" dirty="0"/>
+              <a:t>txt file</a:t>
+            </a:r>
+            <a:endParaRPr lang="en-US" dirty="0"/>
+          </a:p>
+        </p:txBody>
+      </p:sp>
+      <p:sp>
+        <p:nvSpPr>
+          <p:cNvPr id="297" name="TextBox 296">
+            <a:extLst>
+              <a:ext uri="{FF2B5EF4-FFF2-40B4-BE49-F238E27FC236}">
+                <a16:creationId xmlns:a16="http://schemas.microsoft.com/office/drawing/2014/main" id="{6415D4CC-AE67-7105-CAF1-5087066ABE4C}"/>
+              </a:ext>
+            </a:extLst>
+          </p:cNvPr>
+          <p:cNvSpPr txBox="1"/>
+          <p:nvPr/>
+        </p:nvSpPr>
+        <p:spPr>
+          <a:xfrm>
+            <a:off x="1311578" y="1821647"/>
+            <a:ext cx="788999" cy="369332"/>
+          </a:xfrm>
+          <a:prstGeom prst="rect">
+            <a:avLst/>
+          </a:prstGeom>
+          <a:noFill/>
+        </p:spPr>
+        <p:txBody>
+          <a:bodyPr wrap="none" rtlCol="0">
+            <a:spAutoFit/>
+          </a:bodyPr>
+          <a:lstStyle/>
+          <a:p>
+            <a:r>
+              <a:rPr lang="en-GB" dirty="0"/>
+              <a:t>txt file</a:t>
+            </a:r>
+            <a:endParaRPr lang="en-US" dirty="0"/>
+          </a:p>
+        </p:txBody>
+      </p:sp>
+      <p:sp>
+        <p:nvSpPr>
+          <p:cNvPr id="298" name="TextBox 297">
+            <a:extLst>
+              <a:ext uri="{FF2B5EF4-FFF2-40B4-BE49-F238E27FC236}">
+                <a16:creationId xmlns:a16="http://schemas.microsoft.com/office/drawing/2014/main" id="{49D721B9-2D78-CA72-2B72-93A1920C3C2E}"/>
+              </a:ext>
+            </a:extLst>
+          </p:cNvPr>
+          <p:cNvSpPr txBox="1"/>
+          <p:nvPr/>
+        </p:nvSpPr>
+        <p:spPr>
+          <a:xfrm>
+            <a:off x="1271598" y="4710474"/>
+            <a:ext cx="788999" cy="369332"/>
+          </a:xfrm>
+          <a:prstGeom prst="rect">
+            <a:avLst/>
+          </a:prstGeom>
+          <a:noFill/>
+        </p:spPr>
+        <p:txBody>
+          <a:bodyPr wrap="none" rtlCol="0">
+            <a:spAutoFit/>
+          </a:bodyPr>
+          <a:lstStyle/>
+          <a:p>
+            <a:r>
+              <a:rPr lang="en-GB" dirty="0"/>
+              <a:t>txt file</a:t>
+            </a:r>
+            <a:endParaRPr lang="en-US" dirty="0"/>
+          </a:p>
+        </p:txBody>
+      </p:sp>
+    </p:spTree>
+    <p:extLst>
+      <p:ext uri="{BB962C8B-B14F-4D97-AF65-F5344CB8AC3E}">
+        <p14:creationId xmlns:p14="http://schemas.microsoft.com/office/powerpoint/2010/main" val="3572575040"/>
       </p:ext>
     </p:extLst>
   </p:cSld>

</xml_diff>

<commit_message>
Update the presentation of the MOMF modernization, include a slide with graphical abstract
</commit_message>
<xml_diff>
--- a/tests/Workflow tests.pptx
+++ b/tests/Workflow tests.pptx
@@ -12,6 +12,7 @@
     <p:sldId id="260" r:id="rId6"/>
     <p:sldId id="261" r:id="rId7"/>
     <p:sldId id="262" r:id="rId8"/>
+    <p:sldId id="263" r:id="rId9"/>
   </p:sldIdLst>
   <p:sldSz cx="12192000" cy="6858000"/>
   <p:notesSz cx="6858000" cy="9144000"/>
@@ -265,7 +266,7 @@
           <a:p>
             <a:fld id="{658EA266-B578-4102-83B4-FCF105840A2B}" type="datetimeFigureOut">
               <a:rPr lang="en-US" smtClean="0"/>
-              <a:t>7/8/2024</a:t>
+              <a:t>9/10/2024</a:t>
             </a:fld>
             <a:endParaRPr lang="en-US"/>
           </a:p>
@@ -463,7 +464,7 @@
           <a:p>
             <a:fld id="{658EA266-B578-4102-83B4-FCF105840A2B}" type="datetimeFigureOut">
               <a:rPr lang="en-US" smtClean="0"/>
-              <a:t>7/8/2024</a:t>
+              <a:t>9/10/2024</a:t>
             </a:fld>
             <a:endParaRPr lang="en-US"/>
           </a:p>
@@ -671,7 +672,7 @@
           <a:p>
             <a:fld id="{658EA266-B578-4102-83B4-FCF105840A2B}" type="datetimeFigureOut">
               <a:rPr lang="en-US" smtClean="0"/>
-              <a:t>7/8/2024</a:t>
+              <a:t>9/10/2024</a:t>
             </a:fld>
             <a:endParaRPr lang="en-US"/>
           </a:p>
@@ -869,7 +870,7 @@
           <a:p>
             <a:fld id="{658EA266-B578-4102-83B4-FCF105840A2B}" type="datetimeFigureOut">
               <a:rPr lang="en-US" smtClean="0"/>
-              <a:t>7/8/2024</a:t>
+              <a:t>9/10/2024</a:t>
             </a:fld>
             <a:endParaRPr lang="en-US"/>
           </a:p>
@@ -1144,7 +1145,7 @@
           <a:p>
             <a:fld id="{658EA266-B578-4102-83B4-FCF105840A2B}" type="datetimeFigureOut">
               <a:rPr lang="en-US" smtClean="0"/>
-              <a:t>7/8/2024</a:t>
+              <a:t>9/10/2024</a:t>
             </a:fld>
             <a:endParaRPr lang="en-US"/>
           </a:p>
@@ -1409,7 +1410,7 @@
           <a:p>
             <a:fld id="{658EA266-B578-4102-83B4-FCF105840A2B}" type="datetimeFigureOut">
               <a:rPr lang="en-US" smtClean="0"/>
-              <a:t>7/8/2024</a:t>
+              <a:t>9/10/2024</a:t>
             </a:fld>
             <a:endParaRPr lang="en-US"/>
           </a:p>
@@ -1821,7 +1822,7 @@
           <a:p>
             <a:fld id="{658EA266-B578-4102-83B4-FCF105840A2B}" type="datetimeFigureOut">
               <a:rPr lang="en-US" smtClean="0"/>
-              <a:t>7/8/2024</a:t>
+              <a:t>9/10/2024</a:t>
             </a:fld>
             <a:endParaRPr lang="en-US"/>
           </a:p>
@@ -1962,7 +1963,7 @@
           <a:p>
             <a:fld id="{658EA266-B578-4102-83B4-FCF105840A2B}" type="datetimeFigureOut">
               <a:rPr lang="en-US" smtClean="0"/>
-              <a:t>7/8/2024</a:t>
+              <a:t>9/10/2024</a:t>
             </a:fld>
             <a:endParaRPr lang="en-US"/>
           </a:p>
@@ -2075,7 +2076,7 @@
           <a:p>
             <a:fld id="{658EA266-B578-4102-83B4-FCF105840A2B}" type="datetimeFigureOut">
               <a:rPr lang="en-US" smtClean="0"/>
-              <a:t>7/8/2024</a:t>
+              <a:t>9/10/2024</a:t>
             </a:fld>
             <a:endParaRPr lang="en-US"/>
           </a:p>
@@ -2386,7 +2387,7 @@
           <a:p>
             <a:fld id="{658EA266-B578-4102-83B4-FCF105840A2B}" type="datetimeFigureOut">
               <a:rPr lang="en-US" smtClean="0"/>
-              <a:t>7/8/2024</a:t>
+              <a:t>9/10/2024</a:t>
             </a:fld>
             <a:endParaRPr lang="en-US"/>
           </a:p>
@@ -2674,7 +2675,7 @@
           <a:p>
             <a:fld id="{658EA266-B578-4102-83B4-FCF105840A2B}" type="datetimeFigureOut">
               <a:rPr lang="en-US" smtClean="0"/>
-              <a:t>7/8/2024</a:t>
+              <a:t>9/10/2024</a:t>
             </a:fld>
             <a:endParaRPr lang="en-US"/>
           </a:p>
@@ -2915,7 +2916,7 @@
           <a:p>
             <a:fld id="{658EA266-B578-4102-83B4-FCF105840A2B}" type="datetimeFigureOut">
               <a:rPr lang="en-US" smtClean="0"/>
-              <a:t>7/8/2024</a:t>
+              <a:t>9/10/2024</a:t>
             </a:fld>
             <a:endParaRPr lang="en-US"/>
           </a:p>
@@ -4505,7 +4506,7 @@
         </p:nvSpPr>
         <p:spPr>
           <a:xfrm>
-            <a:off x="2617295" y="957705"/>
+            <a:off x="3131866" y="1221896"/>
             <a:ext cx="788999" cy="369332"/>
           </a:xfrm>
           <a:prstGeom prst="rect">
@@ -4595,12 +4596,12 @@
         </p:nvCxnSpPr>
         <p:spPr>
           <a:xfrm flipV="1">
-            <a:off x="5144689" y="569406"/>
-            <a:ext cx="1368456" cy="756474"/>
+            <a:off x="5737399" y="569406"/>
+            <a:ext cx="775746" cy="669273"/>
           </a:xfrm>
           <a:prstGeom prst="bentConnector3">
             <a:avLst>
-              <a:gd name="adj1" fmla="val 50000"/>
+              <a:gd name="adj1" fmla="val 73575"/>
             </a:avLst>
           </a:prstGeom>
           <a:ln>
@@ -4636,7 +4637,7 @@
         </p:nvSpPr>
         <p:spPr>
           <a:xfrm>
-            <a:off x="5227402" y="1258300"/>
+            <a:off x="5562903" y="550220"/>
             <a:ext cx="788999" cy="369332"/>
           </a:xfrm>
           <a:prstGeom prst="rect">
@@ -5166,7 +5167,7 @@
         </p:nvSpPr>
         <p:spPr>
           <a:xfrm>
-            <a:off x="3471337" y="960120"/>
+            <a:off x="4064047" y="872919"/>
             <a:ext cx="1673352" cy="731520"/>
           </a:xfrm>
           <a:prstGeom prst="roundRect">
@@ -5518,59 +5519,6 @@
           </a:p>
         </p:txBody>
       </p:sp>
-      <p:sp>
-        <p:nvSpPr>
-          <p:cNvPr id="129" name="Right Brace 128">
-            <a:extLst>
-              <a:ext uri="{FF2B5EF4-FFF2-40B4-BE49-F238E27FC236}">
-                <a16:creationId xmlns:a16="http://schemas.microsoft.com/office/drawing/2014/main" id="{EE4A86EF-FA59-FF7C-6FC2-6F73737D6D0B}"/>
-              </a:ext>
-            </a:extLst>
-          </p:cNvPr>
-          <p:cNvSpPr/>
-          <p:nvPr/>
-        </p:nvSpPr>
-        <p:spPr>
-          <a:xfrm>
-            <a:off x="5874016" y="1325880"/>
-            <a:ext cx="408002" cy="2776809"/>
-          </a:xfrm>
-          <a:prstGeom prst="rightBrace">
-            <a:avLst/>
-          </a:prstGeom>
-          <a:ln w="19050" cap="flat" cmpd="sng" algn="ctr">
-            <a:solidFill>
-              <a:schemeClr val="dk1"/>
-            </a:solidFill>
-            <a:prstDash val="dash"/>
-            <a:round/>
-            <a:headEnd type="none" w="med" len="med"/>
-            <a:tailEnd type="none" w="med" len="med"/>
-          </a:ln>
-        </p:spPr>
-        <p:style>
-          <a:lnRef idx="0">
-            <a:scrgbClr r="0" g="0" b="0"/>
-          </a:lnRef>
-          <a:fillRef idx="0">
-            <a:scrgbClr r="0" g="0" b="0"/>
-          </a:fillRef>
-          <a:effectRef idx="0">
-            <a:scrgbClr r="0" g="0" b="0"/>
-          </a:effectRef>
-          <a:fontRef idx="minor">
-            <a:schemeClr val="tx1"/>
-          </a:fontRef>
-        </p:style>
-        <p:txBody>
-          <a:bodyPr rtlCol="0" anchor="ctr"/>
-          <a:lstStyle/>
-          <a:p>
-            <a:pPr algn="ctr"/>
-            <a:endParaRPr lang="en-US"/>
-          </a:p>
-        </p:txBody>
-      </p:sp>
       <p:cxnSp>
         <p:nvCxnSpPr>
           <p:cNvPr id="143" name="Connector: Elbow 142">
@@ -5582,7 +5530,6 @@
           </p:cNvPr>
           <p:cNvCxnSpPr>
             <a:cxnSpLocks/>
-            <a:stCxn id="129" idx="1"/>
             <a:endCxn id="128" idx="1"/>
           </p:cNvCxnSpPr>
           <p:nvPr/>
@@ -6909,11 +6856,13 @@
         </p:nvCxnSpPr>
         <p:spPr>
           <a:xfrm flipV="1">
-            <a:off x="2134634" y="1325880"/>
-            <a:ext cx="1336703" cy="1233441"/>
+            <a:off x="2134634" y="1238679"/>
+            <a:ext cx="1929413" cy="1320642"/>
           </a:xfrm>
           <a:prstGeom prst="bentConnector3">
-            <a:avLst/>
+            <a:avLst>
+              <a:gd name="adj1" fmla="val 42417"/>
+            </a:avLst>
           </a:prstGeom>
           <a:ln>
             <a:tailEnd type="triangle"/>
@@ -6955,7 +6904,7 @@
           </a:xfrm>
           <a:prstGeom prst="bentConnector3">
             <a:avLst>
-              <a:gd name="adj1" fmla="val 62532"/>
+              <a:gd name="adj1" fmla="val 51474"/>
             </a:avLst>
           </a:prstGeom>
           <a:ln>
@@ -6991,7 +6940,7 @@
         </p:nvSpPr>
         <p:spPr>
           <a:xfrm>
-            <a:off x="2310232" y="3054585"/>
+            <a:off x="2210373" y="3044904"/>
             <a:ext cx="788999" cy="369332"/>
           </a:xfrm>
           <a:prstGeom prst="rect">
@@ -7162,6 +7111,195 @@
               <a:t>txt file</a:t>
             </a:r>
             <a:endParaRPr lang="en-US" dirty="0"/>
+          </a:p>
+        </p:txBody>
+      </p:sp>
+      <p:cxnSp>
+        <p:nvCxnSpPr>
+          <p:cNvPr id="14" name="Connector: Elbow 13">
+            <a:extLst>
+              <a:ext uri="{FF2B5EF4-FFF2-40B4-BE49-F238E27FC236}">
+                <a16:creationId xmlns:a16="http://schemas.microsoft.com/office/drawing/2014/main" id="{33691F33-5DAD-7EF2-A76B-605587A72F40}"/>
+              </a:ext>
+            </a:extLst>
+          </p:cNvPr>
+          <p:cNvCxnSpPr>
+            <a:cxnSpLocks/>
+          </p:cNvCxnSpPr>
+          <p:nvPr/>
+        </p:nvCxnSpPr>
+        <p:spPr>
+          <a:xfrm rot="10800000" flipV="1">
+            <a:off x="2546826" y="2718533"/>
+            <a:ext cx="3756962" cy="789976"/>
+          </a:xfrm>
+          <a:prstGeom prst="bentConnector3">
+            <a:avLst>
+              <a:gd name="adj1" fmla="val 5703"/>
+            </a:avLst>
+          </a:prstGeom>
+          <a:ln w="19050" cap="flat" cmpd="sng" algn="ctr">
+            <a:solidFill>
+              <a:schemeClr val="dk1"/>
+            </a:solidFill>
+            <a:prstDash val="dash"/>
+            <a:round/>
+            <a:headEnd type="none" w="med" len="med"/>
+            <a:tailEnd type="none" w="med" len="med"/>
+          </a:ln>
+        </p:spPr>
+        <p:style>
+          <a:lnRef idx="0">
+            <a:scrgbClr r="0" g="0" b="0"/>
+          </a:lnRef>
+          <a:fillRef idx="0">
+            <a:scrgbClr r="0" g="0" b="0"/>
+          </a:fillRef>
+          <a:effectRef idx="0">
+            <a:scrgbClr r="0" g="0" b="0"/>
+          </a:effectRef>
+          <a:fontRef idx="minor">
+            <a:schemeClr val="tx1"/>
+          </a:fontRef>
+        </p:style>
+      </p:cxnSp>
+      <p:cxnSp>
+        <p:nvCxnSpPr>
+          <p:cNvPr id="22" name="Straight Connector 21">
+            <a:extLst>
+              <a:ext uri="{FF2B5EF4-FFF2-40B4-BE49-F238E27FC236}">
+                <a16:creationId xmlns:a16="http://schemas.microsoft.com/office/drawing/2014/main" id="{0A6195FF-1F5C-A260-FCD9-7198C47FE79C}"/>
+              </a:ext>
+            </a:extLst>
+          </p:cNvPr>
+          <p:cNvCxnSpPr/>
+          <p:nvPr/>
+        </p:nvCxnSpPr>
+        <p:spPr>
+          <a:xfrm>
+            <a:off x="2546824" y="3490278"/>
+            <a:ext cx="0" cy="365367"/>
+          </a:xfrm>
+          <a:prstGeom prst="line">
+            <a:avLst/>
+          </a:prstGeom>
+          <a:ln w="19050" cap="flat" cmpd="sng" algn="ctr">
+            <a:solidFill>
+              <a:schemeClr val="dk1"/>
+            </a:solidFill>
+            <a:prstDash val="dash"/>
+            <a:round/>
+            <a:headEnd type="none" w="med" len="med"/>
+            <a:tailEnd type="none" w="med" len="med"/>
+          </a:ln>
+        </p:spPr>
+        <p:style>
+          <a:lnRef idx="0">
+            <a:scrgbClr r="0" g="0" b="0"/>
+          </a:lnRef>
+          <a:fillRef idx="0">
+            <a:scrgbClr r="0" g="0" b="0"/>
+          </a:fillRef>
+          <a:effectRef idx="0">
+            <a:scrgbClr r="0" g="0" b="0"/>
+          </a:effectRef>
+          <a:fontRef idx="minor">
+            <a:schemeClr val="tx1"/>
+          </a:fontRef>
+        </p:style>
+      </p:cxnSp>
+      <p:cxnSp>
+        <p:nvCxnSpPr>
+          <p:cNvPr id="24" name="Connector: Elbow 23">
+            <a:extLst>
+              <a:ext uri="{FF2B5EF4-FFF2-40B4-BE49-F238E27FC236}">
+                <a16:creationId xmlns:a16="http://schemas.microsoft.com/office/drawing/2014/main" id="{9B729C41-5D77-7647-B2DA-4E837D17AEF1}"/>
+              </a:ext>
+            </a:extLst>
+          </p:cNvPr>
+          <p:cNvCxnSpPr>
+            <a:cxnSpLocks/>
+            <a:endCxn id="27" idx="1"/>
+          </p:cNvCxnSpPr>
+          <p:nvPr/>
+        </p:nvCxnSpPr>
+        <p:spPr>
+          <a:xfrm rot="10800000">
+            <a:off x="3522996" y="1601311"/>
+            <a:ext cx="2573007" cy="1112979"/>
+          </a:xfrm>
+          <a:prstGeom prst="bentConnector4">
+            <a:avLst>
+              <a:gd name="adj1" fmla="val 70"/>
+              <a:gd name="adj2" fmla="val 85211"/>
+            </a:avLst>
+          </a:prstGeom>
+          <a:ln w="19050" cap="flat" cmpd="sng" algn="ctr">
+            <a:solidFill>
+              <a:schemeClr val="dk1"/>
+            </a:solidFill>
+            <a:prstDash val="dash"/>
+            <a:round/>
+            <a:headEnd type="none" w="med" len="med"/>
+            <a:tailEnd type="none" w="med" len="med"/>
+          </a:ln>
+        </p:spPr>
+        <p:style>
+          <a:lnRef idx="0">
+            <a:scrgbClr r="0" g="0" b="0"/>
+          </a:lnRef>
+          <a:fillRef idx="0">
+            <a:scrgbClr r="0" g="0" b="0"/>
+          </a:fillRef>
+          <a:effectRef idx="0">
+            <a:scrgbClr r="0" g="0" b="0"/>
+          </a:effectRef>
+          <a:fontRef idx="minor">
+            <a:schemeClr val="tx1"/>
+          </a:fontRef>
+        </p:style>
+      </p:cxnSp>
+      <p:sp>
+        <p:nvSpPr>
+          <p:cNvPr id="27" name="Right Brace 26">
+            <a:extLst>
+              <a:ext uri="{FF2B5EF4-FFF2-40B4-BE49-F238E27FC236}">
+                <a16:creationId xmlns:a16="http://schemas.microsoft.com/office/drawing/2014/main" id="{2F0E6A66-50B6-8A74-9FFF-E7AB86538DFE}"/>
+              </a:ext>
+            </a:extLst>
+          </p:cNvPr>
+          <p:cNvSpPr/>
+          <p:nvPr/>
+        </p:nvSpPr>
+        <p:spPr>
+          <a:xfrm rot="5400000">
+            <a:off x="3440743" y="1107353"/>
+            <a:ext cx="164504" cy="823409"/>
+          </a:xfrm>
+          <a:prstGeom prst="rightBrace">
+            <a:avLst/>
+          </a:prstGeom>
+        </p:spPr>
+        <p:style>
+          <a:lnRef idx="2">
+            <a:schemeClr val="dk1"/>
+          </a:lnRef>
+          <a:fillRef idx="0">
+            <a:schemeClr val="dk1"/>
+          </a:fillRef>
+          <a:effectRef idx="1">
+            <a:schemeClr val="dk1"/>
+          </a:effectRef>
+          <a:fontRef idx="minor">
+            <a:schemeClr val="tx1"/>
+          </a:fontRef>
+        </p:style>
+        <p:txBody>
+          <a:bodyPr rtlCol="0" anchor="ctr"/>
+          <a:lstStyle/>
+          <a:p>
+            <a:pPr algn="ctr"/>
+            <a:endParaRPr lang="en-US"/>
           </a:p>
         </p:txBody>
       </p:sp>
@@ -14846,6 +14984,1487 @@
     <p:extLst>
       <p:ext uri="{BB962C8B-B14F-4D97-AF65-F5344CB8AC3E}">
         <p14:creationId xmlns:p14="http://schemas.microsoft.com/office/powerpoint/2010/main" val="681010208"/>
+      </p:ext>
+    </p:extLst>
+  </p:cSld>
+  <p:clrMapOvr>
+    <a:masterClrMapping/>
+  </p:clrMapOvr>
+</p:sld>
+</file>
+
+<file path=ppt/slides/slide8.xml><?xml version="1.0" encoding="utf-8"?>
+<p:sld xmlns:a="http://schemas.openxmlformats.org/drawingml/2006/main" xmlns:r="http://schemas.openxmlformats.org/officeDocument/2006/relationships" xmlns:p="http://schemas.openxmlformats.org/presentationml/2006/main">
+  <p:cSld>
+    <p:spTree>
+      <p:nvGrpSpPr>
+        <p:cNvPr id="1" name=""/>
+        <p:cNvGrpSpPr/>
+        <p:nvPr/>
+      </p:nvGrpSpPr>
+      <p:grpSpPr>
+        <a:xfrm>
+          <a:off x="0" y="0"/>
+          <a:ext cx="0" cy="0"/>
+          <a:chOff x="0" y="0"/>
+          <a:chExt cx="0" cy="0"/>
+        </a:xfrm>
+      </p:grpSpPr>
+      <p:sp>
+        <p:nvSpPr>
+          <p:cNvPr id="6" name="Rectangle 5">
+            <a:extLst>
+              <a:ext uri="{FF2B5EF4-FFF2-40B4-BE49-F238E27FC236}">
+                <a16:creationId xmlns:a16="http://schemas.microsoft.com/office/drawing/2014/main" id="{0DDF910A-20B5-7962-25DA-D0F75F527DB3}"/>
+              </a:ext>
+            </a:extLst>
+          </p:cNvPr>
+          <p:cNvSpPr/>
+          <p:nvPr/>
+        </p:nvSpPr>
+        <p:spPr>
+          <a:xfrm>
+            <a:off x="312494" y="1673131"/>
+            <a:ext cx="3676874" cy="2358353"/>
+          </a:xfrm>
+          <a:prstGeom prst="rect">
+            <a:avLst/>
+          </a:prstGeom>
+          <a:ln w="76200"/>
+        </p:spPr>
+        <p:style>
+          <a:lnRef idx="2">
+            <a:schemeClr val="accent4"/>
+          </a:lnRef>
+          <a:fillRef idx="1">
+            <a:schemeClr val="lt1"/>
+          </a:fillRef>
+          <a:effectRef idx="0">
+            <a:schemeClr val="accent4"/>
+          </a:effectRef>
+          <a:fontRef idx="minor">
+            <a:schemeClr val="dk1"/>
+          </a:fontRef>
+        </p:style>
+        <p:txBody>
+          <a:bodyPr rtlCol="0" anchor="ctr"/>
+          <a:lstStyle/>
+          <a:p>
+            <a:pPr algn="ctr"/>
+            <a:endParaRPr lang="en-US" dirty="0"/>
+          </a:p>
+        </p:txBody>
+      </p:sp>
+      <p:sp>
+        <p:nvSpPr>
+          <p:cNvPr id="4" name="Oval 3">
+            <a:extLst>
+              <a:ext uri="{FF2B5EF4-FFF2-40B4-BE49-F238E27FC236}">
+                <a16:creationId xmlns:a16="http://schemas.microsoft.com/office/drawing/2014/main" id="{3C088407-82CB-B158-C86B-5396329A72B1}"/>
+              </a:ext>
+            </a:extLst>
+          </p:cNvPr>
+          <p:cNvSpPr/>
+          <p:nvPr/>
+        </p:nvSpPr>
+        <p:spPr>
+          <a:xfrm>
+            <a:off x="4178278" y="98567"/>
+            <a:ext cx="3958957" cy="1212996"/>
+          </a:xfrm>
+          <a:prstGeom prst="ellipse">
+            <a:avLst/>
+          </a:prstGeom>
+          <a:solidFill>
+            <a:srgbClr val="FF0000"/>
+          </a:solidFill>
+        </p:spPr>
+        <p:style>
+          <a:lnRef idx="2">
+            <a:schemeClr val="accent4">
+              <a:shade val="15000"/>
+            </a:schemeClr>
+          </a:lnRef>
+          <a:fillRef idx="1">
+            <a:schemeClr val="accent4"/>
+          </a:fillRef>
+          <a:effectRef idx="0">
+            <a:schemeClr val="accent4"/>
+          </a:effectRef>
+          <a:fontRef idx="minor">
+            <a:schemeClr val="lt1"/>
+          </a:fontRef>
+        </p:style>
+        <p:txBody>
+          <a:bodyPr rtlCol="0" anchor="ctr"/>
+          <a:lstStyle/>
+          <a:p>
+            <a:pPr algn="ctr"/>
+            <a:r>
+              <a:rPr lang="es-CR" sz="3200" dirty="0"/>
+              <a:t>MOMF</a:t>
+            </a:r>
+          </a:p>
+          <a:p>
+            <a:pPr algn="ctr"/>
+            <a:r>
+              <a:rPr lang="es-CR" sz="3200" dirty="0" err="1"/>
+              <a:t>modernization</a:t>
+            </a:r>
+            <a:endParaRPr lang="en-US" sz="3200" dirty="0"/>
+          </a:p>
+        </p:txBody>
+      </p:sp>
+      <p:sp>
+        <p:nvSpPr>
+          <p:cNvPr id="13" name="Rectangle: Rounded Corners 12">
+            <a:extLst>
+              <a:ext uri="{FF2B5EF4-FFF2-40B4-BE49-F238E27FC236}">
+                <a16:creationId xmlns:a16="http://schemas.microsoft.com/office/drawing/2014/main" id="{A050DE4F-9E12-10EC-94C9-6EB5BA23E597}"/>
+              </a:ext>
+            </a:extLst>
+          </p:cNvPr>
+          <p:cNvSpPr/>
+          <p:nvPr/>
+        </p:nvSpPr>
+        <p:spPr>
+          <a:xfrm>
+            <a:off x="8055019" y="1673126"/>
+            <a:ext cx="3709595" cy="2358353"/>
+          </a:xfrm>
+          <a:prstGeom prst="roundRect">
+            <a:avLst/>
+          </a:prstGeom>
+          <a:solidFill>
+            <a:schemeClr val="dk1">
+              <a:alpha val="50000"/>
+            </a:schemeClr>
+          </a:solidFill>
+          <a:ln>
+            <a:noFill/>
+          </a:ln>
+        </p:spPr>
+        <p:style>
+          <a:lnRef idx="0">
+            <a:scrgbClr r="0" g="0" b="0"/>
+          </a:lnRef>
+          <a:fillRef idx="0">
+            <a:scrgbClr r="0" g="0" b="0"/>
+          </a:fillRef>
+          <a:effectRef idx="0">
+            <a:scrgbClr r="0" g="0" b="0"/>
+          </a:effectRef>
+          <a:fontRef idx="minor">
+            <a:schemeClr val="lt1"/>
+          </a:fontRef>
+        </p:style>
+        <p:txBody>
+          <a:bodyPr rtlCol="0" anchor="ctr"/>
+          <a:lstStyle/>
+          <a:p>
+            <a:pPr algn="ctr"/>
+            <a:endParaRPr lang="en-GB" dirty="0"/>
+          </a:p>
+        </p:txBody>
+      </p:sp>
+      <p:sp>
+        <p:nvSpPr>
+          <p:cNvPr id="14" name="TextBox 13">
+            <a:extLst>
+              <a:ext uri="{FF2B5EF4-FFF2-40B4-BE49-F238E27FC236}">
+                <a16:creationId xmlns:a16="http://schemas.microsoft.com/office/drawing/2014/main" id="{98C5BF4A-EFEF-5332-A20F-6F408780F523}"/>
+              </a:ext>
+            </a:extLst>
+          </p:cNvPr>
+          <p:cNvSpPr txBox="1"/>
+          <p:nvPr/>
+        </p:nvSpPr>
+        <p:spPr>
+          <a:xfrm>
+            <a:off x="10173945" y="3148499"/>
+            <a:ext cx="728084" cy="369332"/>
+          </a:xfrm>
+          <a:prstGeom prst="rect">
+            <a:avLst/>
+          </a:prstGeom>
+          <a:noFill/>
+        </p:spPr>
+        <p:txBody>
+          <a:bodyPr wrap="square" rtlCol="0">
+            <a:spAutoFit/>
+          </a:bodyPr>
+          <a:lstStyle/>
+          <a:p>
+            <a:r>
+              <a:rPr lang="en-GB" dirty="0">
+                <a:solidFill>
+                  <a:schemeClr val="bg1"/>
+                </a:solidFill>
+              </a:rPr>
+              <a:t>GLPK</a:t>
+            </a:r>
+            <a:endParaRPr lang="en-US" dirty="0">
+              <a:solidFill>
+                <a:schemeClr val="bg1"/>
+              </a:solidFill>
+            </a:endParaRPr>
+          </a:p>
+        </p:txBody>
+      </p:sp>
+      <p:sp>
+        <p:nvSpPr>
+          <p:cNvPr id="15" name="Right Brace 14">
+            <a:extLst>
+              <a:ext uri="{FF2B5EF4-FFF2-40B4-BE49-F238E27FC236}">
+                <a16:creationId xmlns:a16="http://schemas.microsoft.com/office/drawing/2014/main" id="{9F22A259-D8F1-3105-53FD-104846A19A18}"/>
+              </a:ext>
+            </a:extLst>
+          </p:cNvPr>
+          <p:cNvSpPr/>
+          <p:nvPr/>
+        </p:nvSpPr>
+        <p:spPr>
+          <a:xfrm>
+            <a:off x="9969364" y="2944546"/>
+            <a:ext cx="256706" cy="777239"/>
+          </a:xfrm>
+          <a:prstGeom prst="rightBrace">
+            <a:avLst/>
+          </a:prstGeom>
+        </p:spPr>
+        <p:style>
+          <a:lnRef idx="2">
+            <a:schemeClr val="dk1"/>
+          </a:lnRef>
+          <a:fillRef idx="0">
+            <a:schemeClr val="dk1"/>
+          </a:fillRef>
+          <a:effectRef idx="1">
+            <a:schemeClr val="dk1"/>
+          </a:effectRef>
+          <a:fontRef idx="minor">
+            <a:schemeClr val="tx1"/>
+          </a:fontRef>
+        </p:style>
+        <p:txBody>
+          <a:bodyPr rtlCol="0" anchor="ctr"/>
+          <a:lstStyle/>
+          <a:p>
+            <a:pPr algn="ctr"/>
+            <a:endParaRPr lang="en-US"/>
+          </a:p>
+        </p:txBody>
+      </p:sp>
+      <p:cxnSp>
+        <p:nvCxnSpPr>
+          <p:cNvPr id="16" name="Connector: Elbow 15">
+            <a:extLst>
+              <a:ext uri="{FF2B5EF4-FFF2-40B4-BE49-F238E27FC236}">
+                <a16:creationId xmlns:a16="http://schemas.microsoft.com/office/drawing/2014/main" id="{0E37BF9E-6184-92DE-6A38-8A404D97E851}"/>
+              </a:ext>
+            </a:extLst>
+          </p:cNvPr>
+          <p:cNvCxnSpPr>
+            <a:cxnSpLocks/>
+          </p:cNvCxnSpPr>
+          <p:nvPr/>
+        </p:nvCxnSpPr>
+        <p:spPr>
+          <a:xfrm rot="10800000">
+            <a:off x="10021824" y="2792982"/>
+            <a:ext cx="1742790" cy="355508"/>
+          </a:xfrm>
+          <a:prstGeom prst="bentConnector3">
+            <a:avLst>
+              <a:gd name="adj1" fmla="val 33735"/>
+            </a:avLst>
+          </a:prstGeom>
+          <a:ln>
+            <a:tailEnd type="triangle"/>
+          </a:ln>
+        </p:spPr>
+        <p:style>
+          <a:lnRef idx="2">
+            <a:schemeClr val="dk1"/>
+          </a:lnRef>
+          <a:fillRef idx="0">
+            <a:schemeClr val="dk1"/>
+          </a:fillRef>
+          <a:effectRef idx="1">
+            <a:schemeClr val="dk1"/>
+          </a:effectRef>
+          <a:fontRef idx="minor">
+            <a:schemeClr val="tx1"/>
+          </a:fontRef>
+        </p:style>
+      </p:cxnSp>
+      <p:cxnSp>
+        <p:nvCxnSpPr>
+          <p:cNvPr id="17" name="Connector: Elbow 16">
+            <a:extLst>
+              <a:ext uri="{FF2B5EF4-FFF2-40B4-BE49-F238E27FC236}">
+                <a16:creationId xmlns:a16="http://schemas.microsoft.com/office/drawing/2014/main" id="{3C5F475D-CD3C-EA5A-2C9C-D61AEDD1ECF7}"/>
+              </a:ext>
+            </a:extLst>
+          </p:cNvPr>
+          <p:cNvCxnSpPr>
+            <a:cxnSpLocks/>
+            <a:endCxn id="14" idx="3"/>
+          </p:cNvCxnSpPr>
+          <p:nvPr/>
+        </p:nvCxnSpPr>
+        <p:spPr>
+          <a:xfrm rot="5400000">
+            <a:off x="10867729" y="3018537"/>
+            <a:ext cx="348929" cy="280327"/>
+          </a:xfrm>
+          <a:prstGeom prst="bentConnector2">
+            <a:avLst/>
+          </a:prstGeom>
+          <a:ln>
+            <a:tailEnd type="triangle"/>
+          </a:ln>
+        </p:spPr>
+        <p:style>
+          <a:lnRef idx="2">
+            <a:schemeClr val="dk1"/>
+          </a:lnRef>
+          <a:fillRef idx="0">
+            <a:schemeClr val="dk1"/>
+          </a:fillRef>
+          <a:effectRef idx="1">
+            <a:schemeClr val="dk1"/>
+          </a:effectRef>
+          <a:fontRef idx="minor">
+            <a:schemeClr val="tx1"/>
+          </a:fontRef>
+        </p:style>
+      </p:cxnSp>
+      <p:sp>
+        <p:nvSpPr>
+          <p:cNvPr id="18" name="Right Brace 17">
+            <a:extLst>
+              <a:ext uri="{FF2B5EF4-FFF2-40B4-BE49-F238E27FC236}">
+                <a16:creationId xmlns:a16="http://schemas.microsoft.com/office/drawing/2014/main" id="{95D8E15F-1F94-BC35-C73C-00795B6E444C}"/>
+              </a:ext>
+            </a:extLst>
+          </p:cNvPr>
+          <p:cNvSpPr/>
+          <p:nvPr/>
+        </p:nvSpPr>
+        <p:spPr>
+          <a:xfrm rot="10800000">
+            <a:off x="9082778" y="2660700"/>
+            <a:ext cx="297885" cy="1081456"/>
+          </a:xfrm>
+          <a:prstGeom prst="rightBrace">
+            <a:avLst>
+              <a:gd name="adj1" fmla="val 8333"/>
+              <a:gd name="adj2" fmla="val 35626"/>
+            </a:avLst>
+          </a:prstGeom>
+        </p:spPr>
+        <p:style>
+          <a:lnRef idx="2">
+            <a:schemeClr val="dk1"/>
+          </a:lnRef>
+          <a:fillRef idx="0">
+            <a:schemeClr val="dk1"/>
+          </a:fillRef>
+          <a:effectRef idx="1">
+            <a:schemeClr val="dk1"/>
+          </a:effectRef>
+          <a:fontRef idx="minor">
+            <a:schemeClr val="tx1"/>
+          </a:fontRef>
+        </p:style>
+        <p:txBody>
+          <a:bodyPr rtlCol="0" anchor="ctr"/>
+          <a:lstStyle/>
+          <a:p>
+            <a:pPr algn="ctr"/>
+            <a:endParaRPr lang="en-US"/>
+          </a:p>
+        </p:txBody>
+      </p:sp>
+      <p:sp>
+        <p:nvSpPr>
+          <p:cNvPr id="25" name="TextBox 24">
+            <a:extLst>
+              <a:ext uri="{FF2B5EF4-FFF2-40B4-BE49-F238E27FC236}">
+                <a16:creationId xmlns:a16="http://schemas.microsoft.com/office/drawing/2014/main" id="{47573326-EB7D-D9FD-6E93-7944B6465980}"/>
+              </a:ext>
+            </a:extLst>
+          </p:cNvPr>
+          <p:cNvSpPr txBox="1"/>
+          <p:nvPr/>
+        </p:nvSpPr>
+        <p:spPr>
+          <a:xfrm>
+            <a:off x="9212343" y="2613559"/>
+            <a:ext cx="849912" cy="1200329"/>
+          </a:xfrm>
+          <a:prstGeom prst="rect">
+            <a:avLst/>
+          </a:prstGeom>
+          <a:noFill/>
+        </p:spPr>
+        <p:txBody>
+          <a:bodyPr wrap="square" rtlCol="0">
+            <a:spAutoFit/>
+          </a:bodyPr>
+          <a:lstStyle/>
+          <a:p>
+            <a:pPr algn="ctr"/>
+            <a:r>
+              <a:rPr lang="en-GB" dirty="0">
+                <a:solidFill>
+                  <a:schemeClr val="bg1"/>
+                </a:solidFill>
+              </a:rPr>
+              <a:t>GLPK</a:t>
+            </a:r>
+          </a:p>
+          <a:p>
+            <a:pPr algn="ctr"/>
+            <a:r>
+              <a:rPr lang="en-GB" dirty="0">
+                <a:solidFill>
+                  <a:schemeClr val="bg1"/>
+                </a:solidFill>
+              </a:rPr>
+              <a:t>GLPK</a:t>
+            </a:r>
+          </a:p>
+          <a:p>
+            <a:pPr algn="ctr"/>
+            <a:r>
+              <a:rPr lang="en-GB" dirty="0">
+                <a:solidFill>
+                  <a:schemeClr val="bg1"/>
+                </a:solidFill>
+              </a:rPr>
+              <a:t>CBC</a:t>
+            </a:r>
+          </a:p>
+          <a:p>
+            <a:pPr algn="ctr"/>
+            <a:r>
+              <a:rPr lang="en-GB" dirty="0">
+                <a:solidFill>
+                  <a:schemeClr val="bg1"/>
+                </a:solidFill>
+              </a:rPr>
+              <a:t>CPLEX</a:t>
+            </a:r>
+            <a:endParaRPr lang="en-US" dirty="0">
+              <a:solidFill>
+                <a:schemeClr val="bg1"/>
+              </a:solidFill>
+            </a:endParaRPr>
+          </a:p>
+        </p:txBody>
+      </p:sp>
+      <p:sp>
+        <p:nvSpPr>
+          <p:cNvPr id="26" name="TextBox 25">
+            <a:extLst>
+              <a:ext uri="{FF2B5EF4-FFF2-40B4-BE49-F238E27FC236}">
+                <a16:creationId xmlns:a16="http://schemas.microsoft.com/office/drawing/2014/main" id="{2F6A0B11-94F2-299A-0788-DF596DD79C9A}"/>
+              </a:ext>
+            </a:extLst>
+          </p:cNvPr>
+          <p:cNvSpPr txBox="1"/>
+          <p:nvPr/>
+        </p:nvSpPr>
+        <p:spPr>
+          <a:xfrm>
+            <a:off x="9023526" y="1778944"/>
+            <a:ext cx="1819922" cy="461665"/>
+          </a:xfrm>
+          <a:prstGeom prst="rect">
+            <a:avLst/>
+          </a:prstGeom>
+          <a:noFill/>
+        </p:spPr>
+        <p:txBody>
+          <a:bodyPr wrap="none" rtlCol="0">
+            <a:spAutoFit/>
+          </a:bodyPr>
+          <a:lstStyle/>
+          <a:p>
+            <a:r>
+              <a:rPr lang="en-GB" sz="2400" dirty="0">
+                <a:solidFill>
+                  <a:schemeClr val="bg1"/>
+                </a:solidFill>
+              </a:rPr>
+              <a:t>Solver Block</a:t>
+            </a:r>
+            <a:endParaRPr lang="en-US" sz="2400" dirty="0">
+              <a:solidFill>
+                <a:schemeClr val="bg1"/>
+              </a:solidFill>
+            </a:endParaRPr>
+          </a:p>
+        </p:txBody>
+      </p:sp>
+      <p:sp>
+        <p:nvSpPr>
+          <p:cNvPr id="34" name="Rectangle 33">
+            <a:extLst>
+              <a:ext uri="{FF2B5EF4-FFF2-40B4-BE49-F238E27FC236}">
+                <a16:creationId xmlns:a16="http://schemas.microsoft.com/office/drawing/2014/main" id="{C4D5EC6A-909D-B4B1-0187-2F5627081D93}"/>
+              </a:ext>
+            </a:extLst>
+          </p:cNvPr>
+          <p:cNvSpPr/>
+          <p:nvPr/>
+        </p:nvSpPr>
+        <p:spPr>
+          <a:xfrm>
+            <a:off x="554748" y="3181954"/>
+            <a:ext cx="1490545" cy="420753"/>
+          </a:xfrm>
+          <a:prstGeom prst="rect">
+            <a:avLst/>
+          </a:prstGeom>
+        </p:spPr>
+        <p:style>
+          <a:lnRef idx="2">
+            <a:schemeClr val="accent4">
+              <a:shade val="15000"/>
+            </a:schemeClr>
+          </a:lnRef>
+          <a:fillRef idx="1">
+            <a:schemeClr val="accent4"/>
+          </a:fillRef>
+          <a:effectRef idx="0">
+            <a:schemeClr val="accent4"/>
+          </a:effectRef>
+          <a:fontRef idx="minor">
+            <a:schemeClr val="lt1"/>
+          </a:fontRef>
+        </p:style>
+        <p:txBody>
+          <a:bodyPr rtlCol="0" anchor="ctr"/>
+          <a:lstStyle/>
+          <a:p>
+            <a:pPr algn="ctr"/>
+            <a:endParaRPr lang="en-US"/>
+          </a:p>
+        </p:txBody>
+      </p:sp>
+      <p:sp>
+        <p:nvSpPr>
+          <p:cNvPr id="35" name="Rectangle 34">
+            <a:extLst>
+              <a:ext uri="{FF2B5EF4-FFF2-40B4-BE49-F238E27FC236}">
+                <a16:creationId xmlns:a16="http://schemas.microsoft.com/office/drawing/2014/main" id="{AA9E84CA-2022-28E3-DA9F-737FE55B6A96}"/>
+              </a:ext>
+            </a:extLst>
+          </p:cNvPr>
+          <p:cNvSpPr/>
+          <p:nvPr/>
+        </p:nvSpPr>
+        <p:spPr>
+          <a:xfrm>
+            <a:off x="2396889" y="3181954"/>
+            <a:ext cx="1350763" cy="420753"/>
+          </a:xfrm>
+          <a:prstGeom prst="rect">
+            <a:avLst/>
+          </a:prstGeom>
+        </p:spPr>
+        <p:style>
+          <a:lnRef idx="2">
+            <a:schemeClr val="accent4">
+              <a:shade val="15000"/>
+            </a:schemeClr>
+          </a:lnRef>
+          <a:fillRef idx="1">
+            <a:schemeClr val="accent4"/>
+          </a:fillRef>
+          <a:effectRef idx="0">
+            <a:schemeClr val="accent4"/>
+          </a:effectRef>
+          <a:fontRef idx="minor">
+            <a:schemeClr val="lt1"/>
+          </a:fontRef>
+        </p:style>
+        <p:txBody>
+          <a:bodyPr rtlCol="0" anchor="ctr"/>
+          <a:lstStyle/>
+          <a:p>
+            <a:pPr algn="ctr"/>
+            <a:endParaRPr lang="en-US"/>
+          </a:p>
+        </p:txBody>
+      </p:sp>
+      <p:sp>
+        <p:nvSpPr>
+          <p:cNvPr id="33" name="TextBox 32">
+            <a:extLst>
+              <a:ext uri="{FF2B5EF4-FFF2-40B4-BE49-F238E27FC236}">
+                <a16:creationId xmlns:a16="http://schemas.microsoft.com/office/drawing/2014/main" id="{1C25A88C-D70E-E5D1-64C0-0D9F79243AEB}"/>
+              </a:ext>
+            </a:extLst>
+          </p:cNvPr>
+          <p:cNvSpPr txBox="1"/>
+          <p:nvPr/>
+        </p:nvSpPr>
+        <p:spPr>
+          <a:xfrm>
+            <a:off x="668294" y="3181954"/>
+            <a:ext cx="1243354" cy="400110"/>
+          </a:xfrm>
+          <a:prstGeom prst="rect">
+            <a:avLst/>
+          </a:prstGeom>
+          <a:noFill/>
+        </p:spPr>
+        <p:txBody>
+          <a:bodyPr wrap="none" rtlCol="0">
+            <a:spAutoFit/>
+          </a:bodyPr>
+          <a:lstStyle/>
+          <a:p>
+            <a:r>
+              <a:rPr lang="es-CR" sz="2000" dirty="0" err="1">
+                <a:solidFill>
+                  <a:schemeClr val="bg1"/>
+                </a:solidFill>
+              </a:rPr>
+              <a:t>Yaml</a:t>
+            </a:r>
+            <a:r>
+              <a:rPr lang="es-CR" sz="2000" dirty="0">
+                <a:solidFill>
+                  <a:schemeClr val="bg1"/>
+                </a:solidFill>
+              </a:rPr>
+              <a:t> files</a:t>
+            </a:r>
+            <a:endParaRPr lang="en-US" sz="2000" dirty="0">
+              <a:solidFill>
+                <a:schemeClr val="bg1"/>
+              </a:solidFill>
+            </a:endParaRPr>
+          </a:p>
+        </p:txBody>
+      </p:sp>
+      <p:sp>
+        <p:nvSpPr>
+          <p:cNvPr id="27" name="TextBox 26">
+            <a:extLst>
+              <a:ext uri="{FF2B5EF4-FFF2-40B4-BE49-F238E27FC236}">
+                <a16:creationId xmlns:a16="http://schemas.microsoft.com/office/drawing/2014/main" id="{1B93E2E7-F3AE-374E-F071-CF7A0133107E}"/>
+              </a:ext>
+            </a:extLst>
+          </p:cNvPr>
+          <p:cNvSpPr txBox="1"/>
+          <p:nvPr/>
+        </p:nvSpPr>
+        <p:spPr>
+          <a:xfrm>
+            <a:off x="2630820" y="3181954"/>
+            <a:ext cx="891911" cy="400110"/>
+          </a:xfrm>
+          <a:prstGeom prst="rect">
+            <a:avLst/>
+          </a:prstGeom>
+          <a:noFill/>
+        </p:spPr>
+        <p:txBody>
+          <a:bodyPr wrap="none" rtlCol="0">
+            <a:spAutoFit/>
+          </a:bodyPr>
+          <a:lstStyle/>
+          <a:p>
+            <a:r>
+              <a:rPr lang="es-CR" sz="2000" dirty="0" err="1">
+                <a:solidFill>
+                  <a:schemeClr val="bg1"/>
+                </a:solidFill>
+              </a:rPr>
+              <a:t>otoole</a:t>
+            </a:r>
+            <a:endParaRPr lang="en-US" sz="2400" dirty="0">
+              <a:solidFill>
+                <a:schemeClr val="bg1"/>
+              </a:solidFill>
+            </a:endParaRPr>
+          </a:p>
+        </p:txBody>
+      </p:sp>
+      <p:sp>
+        <p:nvSpPr>
+          <p:cNvPr id="38" name="Rectangle 37">
+            <a:extLst>
+              <a:ext uri="{FF2B5EF4-FFF2-40B4-BE49-F238E27FC236}">
+                <a16:creationId xmlns:a16="http://schemas.microsoft.com/office/drawing/2014/main" id="{50E6623C-9AFE-CA12-8932-C94375DCE3D5}"/>
+              </a:ext>
+            </a:extLst>
+          </p:cNvPr>
+          <p:cNvSpPr/>
+          <p:nvPr/>
+        </p:nvSpPr>
+        <p:spPr>
+          <a:xfrm>
+            <a:off x="554749" y="1921488"/>
+            <a:ext cx="3156876" cy="871494"/>
+          </a:xfrm>
+          <a:prstGeom prst="rect">
+            <a:avLst/>
+          </a:prstGeom>
+        </p:spPr>
+        <p:style>
+          <a:lnRef idx="2">
+            <a:schemeClr val="accent4">
+              <a:shade val="15000"/>
+            </a:schemeClr>
+          </a:lnRef>
+          <a:fillRef idx="1">
+            <a:schemeClr val="accent4"/>
+          </a:fillRef>
+          <a:effectRef idx="0">
+            <a:schemeClr val="accent4"/>
+          </a:effectRef>
+          <a:fontRef idx="minor">
+            <a:schemeClr val="lt1"/>
+          </a:fontRef>
+        </p:style>
+        <p:txBody>
+          <a:bodyPr rtlCol="0" anchor="ctr"/>
+          <a:lstStyle/>
+          <a:p>
+            <a:pPr algn="ctr"/>
+            <a:endParaRPr lang="en-US"/>
+          </a:p>
+        </p:txBody>
+      </p:sp>
+      <p:sp>
+        <p:nvSpPr>
+          <p:cNvPr id="32" name="TextBox 31">
+            <a:extLst>
+              <a:ext uri="{FF2B5EF4-FFF2-40B4-BE49-F238E27FC236}">
+                <a16:creationId xmlns:a16="http://schemas.microsoft.com/office/drawing/2014/main" id="{2DF60DD3-B2A9-F080-640D-0F314A1746CC}"/>
+              </a:ext>
+            </a:extLst>
+          </p:cNvPr>
+          <p:cNvSpPr txBox="1"/>
+          <p:nvPr/>
+        </p:nvSpPr>
+        <p:spPr>
+          <a:xfrm>
+            <a:off x="554748" y="1921489"/>
+            <a:ext cx="3156876" cy="830997"/>
+          </a:xfrm>
+          <a:prstGeom prst="rect">
+            <a:avLst/>
+          </a:prstGeom>
+          <a:noFill/>
+        </p:spPr>
+        <p:txBody>
+          <a:bodyPr wrap="square" rtlCol="0">
+            <a:spAutoFit/>
+          </a:bodyPr>
+          <a:lstStyle/>
+          <a:p>
+            <a:pPr algn="ctr"/>
+            <a:r>
+              <a:rPr lang="es-CR" sz="2400" dirty="0" err="1">
+                <a:solidFill>
+                  <a:schemeClr val="bg1"/>
+                </a:solidFill>
+              </a:rPr>
+              <a:t>Configuration</a:t>
+            </a:r>
+            <a:r>
+              <a:rPr lang="es-CR" sz="2400" dirty="0">
+                <a:solidFill>
+                  <a:schemeClr val="bg1"/>
+                </a:solidFill>
+              </a:rPr>
+              <a:t> </a:t>
+            </a:r>
+            <a:r>
+              <a:rPr lang="es-CR" sz="2400" dirty="0" err="1">
+                <a:solidFill>
+                  <a:schemeClr val="bg1"/>
+                </a:solidFill>
+              </a:rPr>
+              <a:t>Improvements</a:t>
+            </a:r>
+            <a:endParaRPr lang="en-US" sz="2400" dirty="0">
+              <a:solidFill>
+                <a:schemeClr val="bg1"/>
+              </a:solidFill>
+            </a:endParaRPr>
+          </a:p>
+        </p:txBody>
+      </p:sp>
+      <p:cxnSp>
+        <p:nvCxnSpPr>
+          <p:cNvPr id="52" name="Connector: Elbow 51">
+            <a:extLst>
+              <a:ext uri="{FF2B5EF4-FFF2-40B4-BE49-F238E27FC236}">
+                <a16:creationId xmlns:a16="http://schemas.microsoft.com/office/drawing/2014/main" id="{28BB3F32-D694-A0EE-ED68-2FDC19A40BCF}"/>
+              </a:ext>
+            </a:extLst>
+          </p:cNvPr>
+          <p:cNvCxnSpPr>
+            <a:cxnSpLocks/>
+            <a:stCxn id="4" idx="2"/>
+            <a:endCxn id="6" idx="0"/>
+          </p:cNvCxnSpPr>
+          <p:nvPr/>
+        </p:nvCxnSpPr>
+        <p:spPr>
+          <a:xfrm rot="10800000" flipV="1">
+            <a:off x="2150932" y="705065"/>
+            <a:ext cx="2027347" cy="968066"/>
+          </a:xfrm>
+          <a:prstGeom prst="bentConnector2">
+            <a:avLst/>
+          </a:prstGeom>
+          <a:ln>
+            <a:tailEnd type="triangle"/>
+          </a:ln>
+        </p:spPr>
+        <p:style>
+          <a:lnRef idx="2">
+            <a:schemeClr val="dk1"/>
+          </a:lnRef>
+          <a:fillRef idx="0">
+            <a:schemeClr val="dk1"/>
+          </a:fillRef>
+          <a:effectRef idx="1">
+            <a:schemeClr val="dk1"/>
+          </a:effectRef>
+          <a:fontRef idx="minor">
+            <a:schemeClr val="tx1"/>
+          </a:fontRef>
+        </p:style>
+      </p:cxnSp>
+      <p:cxnSp>
+        <p:nvCxnSpPr>
+          <p:cNvPr id="54" name="Connector: Elbow 53">
+            <a:extLst>
+              <a:ext uri="{FF2B5EF4-FFF2-40B4-BE49-F238E27FC236}">
+                <a16:creationId xmlns:a16="http://schemas.microsoft.com/office/drawing/2014/main" id="{0803D7C9-601D-DAAC-FD9F-D4324F11FB16}"/>
+              </a:ext>
+            </a:extLst>
+          </p:cNvPr>
+          <p:cNvCxnSpPr>
+            <a:cxnSpLocks/>
+            <a:stCxn id="4" idx="6"/>
+            <a:endCxn id="13" idx="0"/>
+          </p:cNvCxnSpPr>
+          <p:nvPr/>
+        </p:nvCxnSpPr>
+        <p:spPr>
+          <a:xfrm>
+            <a:off x="8137235" y="705065"/>
+            <a:ext cx="1772582" cy="968061"/>
+          </a:xfrm>
+          <a:prstGeom prst="bentConnector2">
+            <a:avLst/>
+          </a:prstGeom>
+          <a:ln>
+            <a:tailEnd type="triangle"/>
+          </a:ln>
+        </p:spPr>
+        <p:style>
+          <a:lnRef idx="2">
+            <a:schemeClr val="dk1"/>
+          </a:lnRef>
+          <a:fillRef idx="0">
+            <a:schemeClr val="dk1"/>
+          </a:fillRef>
+          <a:effectRef idx="1">
+            <a:schemeClr val="dk1"/>
+          </a:effectRef>
+          <a:fontRef idx="minor">
+            <a:schemeClr val="tx1"/>
+          </a:fontRef>
+        </p:style>
+      </p:cxnSp>
+      <p:cxnSp>
+        <p:nvCxnSpPr>
+          <p:cNvPr id="56" name="Straight Arrow Connector 55">
+            <a:extLst>
+              <a:ext uri="{FF2B5EF4-FFF2-40B4-BE49-F238E27FC236}">
+                <a16:creationId xmlns:a16="http://schemas.microsoft.com/office/drawing/2014/main" id="{71F18F03-5E95-9613-724C-B3AABD42349E}"/>
+              </a:ext>
+            </a:extLst>
+          </p:cNvPr>
+          <p:cNvCxnSpPr>
+            <a:cxnSpLocks/>
+            <a:stCxn id="18" idx="1"/>
+            <a:endCxn id="35" idx="3"/>
+          </p:cNvCxnSpPr>
+          <p:nvPr/>
+        </p:nvCxnSpPr>
+        <p:spPr>
+          <a:xfrm flipH="1">
+            <a:off x="3747652" y="3356876"/>
+            <a:ext cx="5335126" cy="35455"/>
+          </a:xfrm>
+          <a:prstGeom prst="straightConnector1">
+            <a:avLst/>
+          </a:prstGeom>
+          <a:ln w="19050" cap="flat" cmpd="sng" algn="ctr">
+            <a:solidFill>
+              <a:schemeClr val="dk1"/>
+            </a:solidFill>
+            <a:prstDash val="dash"/>
+            <a:round/>
+            <a:headEnd type="none" w="med" len="med"/>
+            <a:tailEnd type="none" w="med" len="med"/>
+          </a:ln>
+        </p:spPr>
+        <p:style>
+          <a:lnRef idx="0">
+            <a:scrgbClr r="0" g="0" b="0"/>
+          </a:lnRef>
+          <a:fillRef idx="0">
+            <a:scrgbClr r="0" g="0" b="0"/>
+          </a:fillRef>
+          <a:effectRef idx="0">
+            <a:scrgbClr r="0" g="0" b="0"/>
+          </a:effectRef>
+          <a:fontRef idx="minor">
+            <a:schemeClr val="tx1"/>
+          </a:fontRef>
+        </p:style>
+      </p:cxnSp>
+      <p:cxnSp>
+        <p:nvCxnSpPr>
+          <p:cNvPr id="59" name="Straight Arrow Connector 58">
+            <a:extLst>
+              <a:ext uri="{FF2B5EF4-FFF2-40B4-BE49-F238E27FC236}">
+                <a16:creationId xmlns:a16="http://schemas.microsoft.com/office/drawing/2014/main" id="{EA519446-06B6-4907-0580-552E3DE623F7}"/>
+              </a:ext>
+            </a:extLst>
+          </p:cNvPr>
+          <p:cNvCxnSpPr>
+            <a:cxnSpLocks/>
+          </p:cNvCxnSpPr>
+          <p:nvPr/>
+        </p:nvCxnSpPr>
+        <p:spPr>
+          <a:xfrm flipH="1">
+            <a:off x="8178151" y="3521755"/>
+            <a:ext cx="641956" cy="0"/>
+          </a:xfrm>
+          <a:prstGeom prst="straightConnector1">
+            <a:avLst/>
+          </a:prstGeom>
+          <a:ln w="19050" cap="flat" cmpd="sng" algn="ctr">
+            <a:solidFill>
+              <a:schemeClr val="dk1"/>
+            </a:solidFill>
+            <a:prstDash val="solid"/>
+            <a:round/>
+            <a:headEnd type="none" w="med" len="med"/>
+            <a:tailEnd type="arrow" w="med" len="med"/>
+          </a:ln>
+        </p:spPr>
+        <p:style>
+          <a:lnRef idx="0">
+            <a:scrgbClr r="0" g="0" b="0"/>
+          </a:lnRef>
+          <a:fillRef idx="0">
+            <a:scrgbClr r="0" g="0" b="0"/>
+          </a:fillRef>
+          <a:effectRef idx="0">
+            <a:scrgbClr r="0" g="0" b="0"/>
+          </a:effectRef>
+          <a:fontRef idx="minor">
+            <a:schemeClr val="tx1"/>
+          </a:fontRef>
+        </p:style>
+      </p:cxnSp>
+      <p:cxnSp>
+        <p:nvCxnSpPr>
+          <p:cNvPr id="60" name="Straight Arrow Connector 59">
+            <a:extLst>
+              <a:ext uri="{FF2B5EF4-FFF2-40B4-BE49-F238E27FC236}">
+                <a16:creationId xmlns:a16="http://schemas.microsoft.com/office/drawing/2014/main" id="{3A073F16-1B1B-48FE-79F7-2F66E8DBD7E9}"/>
+              </a:ext>
+            </a:extLst>
+          </p:cNvPr>
+          <p:cNvCxnSpPr>
+            <a:cxnSpLocks/>
+          </p:cNvCxnSpPr>
+          <p:nvPr/>
+        </p:nvCxnSpPr>
+        <p:spPr>
+          <a:xfrm flipH="1">
+            <a:off x="4253851" y="3523718"/>
+            <a:ext cx="641956" cy="0"/>
+          </a:xfrm>
+          <a:prstGeom prst="straightConnector1">
+            <a:avLst/>
+          </a:prstGeom>
+          <a:ln w="19050" cap="flat" cmpd="sng" algn="ctr">
+            <a:solidFill>
+              <a:schemeClr val="dk1"/>
+            </a:solidFill>
+            <a:prstDash val="solid"/>
+            <a:round/>
+            <a:headEnd type="none" w="med" len="med"/>
+            <a:tailEnd type="arrow" w="med" len="med"/>
+          </a:ln>
+        </p:spPr>
+        <p:style>
+          <a:lnRef idx="0">
+            <a:scrgbClr r="0" g="0" b="0"/>
+          </a:lnRef>
+          <a:fillRef idx="0">
+            <a:scrgbClr r="0" g="0" b="0"/>
+          </a:fillRef>
+          <a:effectRef idx="0">
+            <a:scrgbClr r="0" g="0" b="0"/>
+          </a:effectRef>
+          <a:fontRef idx="minor">
+            <a:schemeClr val="tx1"/>
+          </a:fontRef>
+        </p:style>
+      </p:cxnSp>
+      <p:cxnSp>
+        <p:nvCxnSpPr>
+          <p:cNvPr id="61" name="Straight Arrow Connector 60">
+            <a:extLst>
+              <a:ext uri="{FF2B5EF4-FFF2-40B4-BE49-F238E27FC236}">
+                <a16:creationId xmlns:a16="http://schemas.microsoft.com/office/drawing/2014/main" id="{46D53F85-B225-000F-DD8B-F3FF8207C137}"/>
+              </a:ext>
+            </a:extLst>
+          </p:cNvPr>
+          <p:cNvCxnSpPr>
+            <a:cxnSpLocks/>
+          </p:cNvCxnSpPr>
+          <p:nvPr/>
+        </p:nvCxnSpPr>
+        <p:spPr>
+          <a:xfrm flipH="1">
+            <a:off x="5435756" y="3519793"/>
+            <a:ext cx="641956" cy="0"/>
+          </a:xfrm>
+          <a:prstGeom prst="straightConnector1">
+            <a:avLst/>
+          </a:prstGeom>
+          <a:ln w="19050" cap="flat" cmpd="sng" algn="ctr">
+            <a:solidFill>
+              <a:schemeClr val="dk1"/>
+            </a:solidFill>
+            <a:prstDash val="solid"/>
+            <a:round/>
+            <a:headEnd type="none" w="med" len="med"/>
+            <a:tailEnd type="arrow" w="med" len="med"/>
+          </a:ln>
+        </p:spPr>
+        <p:style>
+          <a:lnRef idx="0">
+            <a:scrgbClr r="0" g="0" b="0"/>
+          </a:lnRef>
+          <a:fillRef idx="0">
+            <a:scrgbClr r="0" g="0" b="0"/>
+          </a:fillRef>
+          <a:effectRef idx="0">
+            <a:scrgbClr r="0" g="0" b="0"/>
+          </a:effectRef>
+          <a:fontRef idx="minor">
+            <a:schemeClr val="tx1"/>
+          </a:fontRef>
+        </p:style>
+      </p:cxnSp>
+      <p:cxnSp>
+        <p:nvCxnSpPr>
+          <p:cNvPr id="62" name="Straight Arrow Connector 61">
+            <a:extLst>
+              <a:ext uri="{FF2B5EF4-FFF2-40B4-BE49-F238E27FC236}">
+                <a16:creationId xmlns:a16="http://schemas.microsoft.com/office/drawing/2014/main" id="{9B547C6D-2FAD-94A3-FB9F-A7E0BC22C5D5}"/>
+              </a:ext>
+            </a:extLst>
+          </p:cNvPr>
+          <p:cNvCxnSpPr>
+            <a:cxnSpLocks/>
+          </p:cNvCxnSpPr>
+          <p:nvPr/>
+        </p:nvCxnSpPr>
+        <p:spPr>
+          <a:xfrm flipH="1">
+            <a:off x="6870051" y="3517831"/>
+            <a:ext cx="641956" cy="0"/>
+          </a:xfrm>
+          <a:prstGeom prst="straightConnector1">
+            <a:avLst/>
+          </a:prstGeom>
+          <a:ln w="19050" cap="flat" cmpd="sng" algn="ctr">
+            <a:solidFill>
+              <a:schemeClr val="dk1"/>
+            </a:solidFill>
+            <a:prstDash val="solid"/>
+            <a:round/>
+            <a:headEnd type="none" w="med" len="med"/>
+            <a:tailEnd type="arrow" w="med" len="med"/>
+          </a:ln>
+        </p:spPr>
+        <p:style>
+          <a:lnRef idx="0">
+            <a:scrgbClr r="0" g="0" b="0"/>
+          </a:lnRef>
+          <a:fillRef idx="0">
+            <a:scrgbClr r="0" g="0" b="0"/>
+          </a:fillRef>
+          <a:effectRef idx="0">
+            <a:scrgbClr r="0" g="0" b="0"/>
+          </a:effectRef>
+          <a:fontRef idx="minor">
+            <a:schemeClr val="tx1"/>
+          </a:fontRef>
+        </p:style>
+      </p:cxnSp>
+      <p:sp>
+        <p:nvSpPr>
+          <p:cNvPr id="63" name="Rectangle: Diagonal Corners Snipped 62">
+            <a:extLst>
+              <a:ext uri="{FF2B5EF4-FFF2-40B4-BE49-F238E27FC236}">
+                <a16:creationId xmlns:a16="http://schemas.microsoft.com/office/drawing/2014/main" id="{E0B1A527-A7E7-ED25-F060-03BE78BA2B1C}"/>
+              </a:ext>
+            </a:extLst>
+          </p:cNvPr>
+          <p:cNvSpPr/>
+          <p:nvPr/>
+        </p:nvSpPr>
+        <p:spPr>
+          <a:xfrm>
+            <a:off x="4095375" y="4838700"/>
+            <a:ext cx="4101064" cy="1727199"/>
+          </a:xfrm>
+          <a:prstGeom prst="snip2DiagRect">
+            <a:avLst/>
+          </a:prstGeom>
+        </p:spPr>
+        <p:style>
+          <a:lnRef idx="2">
+            <a:schemeClr val="accent6">
+              <a:shade val="15000"/>
+            </a:schemeClr>
+          </a:lnRef>
+          <a:fillRef idx="1">
+            <a:schemeClr val="accent6"/>
+          </a:fillRef>
+          <a:effectRef idx="0">
+            <a:schemeClr val="accent6"/>
+          </a:effectRef>
+          <a:fontRef idx="minor">
+            <a:schemeClr val="lt1"/>
+          </a:fontRef>
+        </p:style>
+        <p:txBody>
+          <a:bodyPr rtlCol="0" anchor="ctr"/>
+          <a:lstStyle/>
+          <a:p>
+            <a:pPr algn="ctr"/>
+            <a:endParaRPr lang="en-US" dirty="0"/>
+          </a:p>
+        </p:txBody>
+      </p:sp>
+      <p:sp>
+        <p:nvSpPr>
+          <p:cNvPr id="64" name="TextBox 63">
+            <a:extLst>
+              <a:ext uri="{FF2B5EF4-FFF2-40B4-BE49-F238E27FC236}">
+                <a16:creationId xmlns:a16="http://schemas.microsoft.com/office/drawing/2014/main" id="{A1CE9D60-E68F-D15D-DFBC-A66DC5DC4A06}"/>
+              </a:ext>
+            </a:extLst>
+          </p:cNvPr>
+          <p:cNvSpPr txBox="1"/>
+          <p:nvPr/>
+        </p:nvSpPr>
+        <p:spPr>
+          <a:xfrm>
+            <a:off x="4979177" y="4751524"/>
+            <a:ext cx="2333459" cy="523220"/>
+          </a:xfrm>
+          <a:prstGeom prst="rect">
+            <a:avLst/>
+          </a:prstGeom>
+          <a:noFill/>
+        </p:spPr>
+        <p:txBody>
+          <a:bodyPr wrap="none" rtlCol="0">
+            <a:spAutoFit/>
+          </a:bodyPr>
+          <a:lstStyle/>
+          <a:p>
+            <a:r>
+              <a:rPr lang="es-CR" sz="2400" dirty="0" err="1">
+                <a:solidFill>
+                  <a:schemeClr val="bg1"/>
+                </a:solidFill>
+              </a:rPr>
+              <a:t>Validation</a:t>
+            </a:r>
+            <a:r>
+              <a:rPr lang="es-CR" sz="2800" dirty="0">
+                <a:solidFill>
+                  <a:schemeClr val="bg1"/>
+                </a:solidFill>
+              </a:rPr>
+              <a:t> </a:t>
+            </a:r>
+            <a:r>
+              <a:rPr lang="es-CR" sz="2400" dirty="0">
+                <a:solidFill>
+                  <a:schemeClr val="bg1"/>
+                </a:solidFill>
+              </a:rPr>
+              <a:t>Block</a:t>
+            </a:r>
+            <a:endParaRPr lang="en-US" sz="2800" dirty="0">
+              <a:solidFill>
+                <a:schemeClr val="bg1"/>
+              </a:solidFill>
+            </a:endParaRPr>
+          </a:p>
+        </p:txBody>
+      </p:sp>
+      <p:cxnSp>
+        <p:nvCxnSpPr>
+          <p:cNvPr id="86" name="Connector: Elbow 85">
+            <a:extLst>
+              <a:ext uri="{FF2B5EF4-FFF2-40B4-BE49-F238E27FC236}">
+                <a16:creationId xmlns:a16="http://schemas.microsoft.com/office/drawing/2014/main" id="{E88CB9BE-D138-E61A-51E2-6205690D7636}"/>
+              </a:ext>
+            </a:extLst>
+          </p:cNvPr>
+          <p:cNvCxnSpPr>
+            <a:stCxn id="13" idx="2"/>
+            <a:endCxn id="63" idx="0"/>
+          </p:cNvCxnSpPr>
+          <p:nvPr/>
+        </p:nvCxnSpPr>
+        <p:spPr>
+          <a:xfrm rot="5400000">
+            <a:off x="8217718" y="4010200"/>
+            <a:ext cx="1670821" cy="1713378"/>
+          </a:xfrm>
+          <a:prstGeom prst="bentConnector2">
+            <a:avLst/>
+          </a:prstGeom>
+          <a:ln w="19050" cap="flat" cmpd="sng" algn="ctr">
+            <a:solidFill>
+              <a:schemeClr val="dk1"/>
+            </a:solidFill>
+            <a:prstDash val="solid"/>
+            <a:round/>
+            <a:headEnd type="none" w="med" len="med"/>
+            <a:tailEnd type="arrow" w="med" len="med"/>
+          </a:ln>
+        </p:spPr>
+        <p:style>
+          <a:lnRef idx="0">
+            <a:scrgbClr r="0" g="0" b="0"/>
+          </a:lnRef>
+          <a:fillRef idx="0">
+            <a:scrgbClr r="0" g="0" b="0"/>
+          </a:fillRef>
+          <a:effectRef idx="0">
+            <a:scrgbClr r="0" g="0" b="0"/>
+          </a:effectRef>
+          <a:fontRef idx="minor">
+            <a:schemeClr val="tx1"/>
+          </a:fontRef>
+        </p:style>
+      </p:cxnSp>
+      <p:cxnSp>
+        <p:nvCxnSpPr>
+          <p:cNvPr id="88" name="Connector: Elbow 87">
+            <a:extLst>
+              <a:ext uri="{FF2B5EF4-FFF2-40B4-BE49-F238E27FC236}">
+                <a16:creationId xmlns:a16="http://schemas.microsoft.com/office/drawing/2014/main" id="{A4ED0328-3952-C5DD-962E-8F3CB3C30FDF}"/>
+              </a:ext>
+            </a:extLst>
+          </p:cNvPr>
+          <p:cNvCxnSpPr>
+            <a:stCxn id="6" idx="2"/>
+            <a:endCxn id="63" idx="2"/>
+          </p:cNvCxnSpPr>
+          <p:nvPr/>
+        </p:nvCxnSpPr>
+        <p:spPr>
+          <a:xfrm rot="16200000" flipH="1">
+            <a:off x="2287745" y="3894670"/>
+            <a:ext cx="1670816" cy="1944444"/>
+          </a:xfrm>
+          <a:prstGeom prst="bentConnector2">
+            <a:avLst/>
+          </a:prstGeom>
+          <a:ln w="19050" cap="flat" cmpd="sng" algn="ctr">
+            <a:solidFill>
+              <a:schemeClr val="dk1"/>
+            </a:solidFill>
+            <a:prstDash val="solid"/>
+            <a:round/>
+            <a:headEnd type="none" w="med" len="med"/>
+            <a:tailEnd type="arrow" w="med" len="med"/>
+          </a:ln>
+        </p:spPr>
+        <p:style>
+          <a:lnRef idx="0">
+            <a:scrgbClr r="0" g="0" b="0"/>
+          </a:lnRef>
+          <a:fillRef idx="0">
+            <a:scrgbClr r="0" g="0" b="0"/>
+          </a:fillRef>
+          <a:effectRef idx="0">
+            <a:scrgbClr r="0" g="0" b="0"/>
+          </a:effectRef>
+          <a:fontRef idx="minor">
+            <a:schemeClr val="tx1"/>
+          </a:fontRef>
+        </p:style>
+      </p:cxnSp>
+      <p:sp>
+        <p:nvSpPr>
+          <p:cNvPr id="90" name="TextBox 89">
+            <a:extLst>
+              <a:ext uri="{FF2B5EF4-FFF2-40B4-BE49-F238E27FC236}">
+                <a16:creationId xmlns:a16="http://schemas.microsoft.com/office/drawing/2014/main" id="{79A41D1F-916B-E3BF-5034-0A4CA0D23E01}"/>
+              </a:ext>
+            </a:extLst>
+          </p:cNvPr>
+          <p:cNvSpPr txBox="1"/>
+          <p:nvPr/>
+        </p:nvSpPr>
+        <p:spPr>
+          <a:xfrm>
+            <a:off x="8085272" y="3016762"/>
+            <a:ext cx="904214" cy="369332"/>
+          </a:xfrm>
+          <a:prstGeom prst="rect">
+            <a:avLst/>
+          </a:prstGeom>
+          <a:noFill/>
+        </p:spPr>
+        <p:txBody>
+          <a:bodyPr wrap="square" rtlCol="0">
+            <a:spAutoFit/>
+          </a:bodyPr>
+          <a:lstStyle/>
+          <a:p>
+            <a:r>
+              <a:rPr lang="en-GB" dirty="0">
+                <a:solidFill>
+                  <a:schemeClr val="bg1"/>
+                </a:solidFill>
+              </a:rPr>
+              <a:t>txt file</a:t>
+            </a:r>
+            <a:endParaRPr lang="en-US" dirty="0">
+              <a:solidFill>
+                <a:schemeClr val="bg1"/>
+              </a:solidFill>
+            </a:endParaRPr>
+          </a:p>
+        </p:txBody>
+      </p:sp>
+      <p:sp>
+        <p:nvSpPr>
+          <p:cNvPr id="91" name="TextBox 90">
+            <a:extLst>
+              <a:ext uri="{FF2B5EF4-FFF2-40B4-BE49-F238E27FC236}">
+                <a16:creationId xmlns:a16="http://schemas.microsoft.com/office/drawing/2014/main" id="{2DE88F13-EFC5-3197-0D1C-6D85C64B8BC8}"/>
+              </a:ext>
+            </a:extLst>
+          </p:cNvPr>
+          <p:cNvSpPr txBox="1"/>
+          <p:nvPr/>
+        </p:nvSpPr>
+        <p:spPr>
+          <a:xfrm>
+            <a:off x="5084000" y="5274744"/>
+            <a:ext cx="2147511" cy="883383"/>
+          </a:xfrm>
+          <a:prstGeom prst="rect">
+            <a:avLst/>
+          </a:prstGeom>
+          <a:noFill/>
+        </p:spPr>
+        <p:txBody>
+          <a:bodyPr wrap="none" rtlCol="0">
+            <a:spAutoFit/>
+          </a:bodyPr>
+          <a:lstStyle/>
+          <a:p>
+            <a:pPr algn="ctr">
+              <a:lnSpc>
+                <a:spcPct val="150000"/>
+              </a:lnSpc>
+            </a:pPr>
+            <a:r>
+              <a:rPr lang="es-CR" dirty="0" err="1">
+                <a:solidFill>
+                  <a:schemeClr val="bg1"/>
+                </a:solidFill>
+              </a:rPr>
+              <a:t>Validation</a:t>
+            </a:r>
+            <a:r>
+              <a:rPr lang="es-CR" dirty="0">
+                <a:solidFill>
+                  <a:schemeClr val="bg1"/>
+                </a:solidFill>
+              </a:rPr>
+              <a:t> test</a:t>
+            </a:r>
+          </a:p>
+          <a:p>
+            <a:pPr algn="ctr">
+              <a:lnSpc>
+                <a:spcPct val="150000"/>
+              </a:lnSpc>
+            </a:pPr>
+            <a:r>
+              <a:rPr lang="es-CR" dirty="0" err="1">
+                <a:solidFill>
+                  <a:schemeClr val="bg1"/>
+                </a:solidFill>
+              </a:rPr>
+              <a:t>Comparison</a:t>
+            </a:r>
+            <a:r>
+              <a:rPr lang="es-CR" dirty="0">
+                <a:solidFill>
+                  <a:schemeClr val="bg1"/>
+                </a:solidFill>
+              </a:rPr>
+              <a:t> </a:t>
+            </a:r>
+            <a:r>
+              <a:rPr lang="es-CR" dirty="0" err="1">
+                <a:solidFill>
+                  <a:schemeClr val="bg1"/>
+                </a:solidFill>
+              </a:rPr>
+              <a:t>results</a:t>
+            </a:r>
+            <a:endParaRPr lang="en-US" dirty="0">
+              <a:solidFill>
+                <a:schemeClr val="bg1"/>
+              </a:solidFill>
+            </a:endParaRPr>
+          </a:p>
+        </p:txBody>
+      </p:sp>
+    </p:spTree>
+    <p:extLst>
+      <p:ext uri="{BB962C8B-B14F-4D97-AF65-F5344CB8AC3E}">
+        <p14:creationId xmlns:p14="http://schemas.microsoft.com/office/powerpoint/2010/main" val="583312468"/>
       </p:ext>
     </p:extLst>
   </p:cSld>

</xml_diff>